<commit_message>
new files added and ppt mistakes edited
</commit_message>
<xml_diff>
--- a/Batch 8 .pptx
+++ b/Batch 8 .pptx
@@ -218,7 +218,7 @@
           <a:p>
             <a:fld id="{97AC54EF-F27B-4F5F-8C1D-285B121E0FF0}" type="datetimeFigureOut">
               <a:rPr lang="en-US" smtClean="0"/>
-              <a:t>4/11/2025</a:t>
+              <a:t>4/12/2025</a:t>
             </a:fld>
             <a:endParaRPr lang="en-US"/>
           </a:p>
@@ -716,7 +716,7 @@
           <a:p>
             <a:fld id="{06E713BE-B739-4CC0-B4CE-95E82AEB026E}" type="datetimeFigureOut">
               <a:rPr lang="en-US" smtClean="0"/>
-              <a:t>4/11/2025</a:t>
+              <a:t>4/12/2025</a:t>
             </a:fld>
             <a:endParaRPr lang="en-US" dirty="0"/>
           </a:p>
@@ -914,7 +914,7 @@
           <a:p>
             <a:fld id="{06E713BE-B739-4CC0-B4CE-95E82AEB026E}" type="datetimeFigureOut">
               <a:rPr lang="en-US" smtClean="0"/>
-              <a:t>4/11/2025</a:t>
+              <a:t>4/12/2025</a:t>
             </a:fld>
             <a:endParaRPr lang="en-US" dirty="0"/>
           </a:p>
@@ -1122,7 +1122,7 @@
           <a:p>
             <a:fld id="{06E713BE-B739-4CC0-B4CE-95E82AEB026E}" type="datetimeFigureOut">
               <a:rPr lang="en-US" smtClean="0"/>
-              <a:t>4/11/2025</a:t>
+              <a:t>4/12/2025</a:t>
             </a:fld>
             <a:endParaRPr lang="en-US" dirty="0"/>
           </a:p>
@@ -1320,7 +1320,7 @@
           <a:p>
             <a:fld id="{06E713BE-B739-4CC0-B4CE-95E82AEB026E}" type="datetimeFigureOut">
               <a:rPr lang="en-US" smtClean="0"/>
-              <a:t>4/11/2025</a:t>
+              <a:t>4/12/2025</a:t>
             </a:fld>
             <a:endParaRPr lang="en-US" dirty="0"/>
           </a:p>
@@ -1595,7 +1595,7 @@
           <a:p>
             <a:fld id="{06E713BE-B739-4CC0-B4CE-95E82AEB026E}" type="datetimeFigureOut">
               <a:rPr lang="en-US" smtClean="0"/>
-              <a:t>4/11/2025</a:t>
+              <a:t>4/12/2025</a:t>
             </a:fld>
             <a:endParaRPr lang="en-US" dirty="0"/>
           </a:p>
@@ -1860,7 +1860,7 @@
           <a:p>
             <a:fld id="{06E713BE-B739-4CC0-B4CE-95E82AEB026E}" type="datetimeFigureOut">
               <a:rPr lang="en-US" smtClean="0"/>
-              <a:t>4/11/2025</a:t>
+              <a:t>4/12/2025</a:t>
             </a:fld>
             <a:endParaRPr lang="en-US" dirty="0"/>
           </a:p>
@@ -2272,7 +2272,7 @@
           <a:p>
             <a:fld id="{06E713BE-B739-4CC0-B4CE-95E82AEB026E}" type="datetimeFigureOut">
               <a:rPr lang="en-US" smtClean="0"/>
-              <a:t>4/11/2025</a:t>
+              <a:t>4/12/2025</a:t>
             </a:fld>
             <a:endParaRPr lang="en-US" dirty="0"/>
           </a:p>
@@ -2413,7 +2413,7 @@
           <a:p>
             <a:fld id="{06E713BE-B739-4CC0-B4CE-95E82AEB026E}" type="datetimeFigureOut">
               <a:rPr lang="en-US" smtClean="0"/>
-              <a:t>4/11/2025</a:t>
+              <a:t>4/12/2025</a:t>
             </a:fld>
             <a:endParaRPr lang="en-US" dirty="0"/>
           </a:p>
@@ -2526,7 +2526,7 @@
           <a:p>
             <a:fld id="{06E713BE-B739-4CC0-B4CE-95E82AEB026E}" type="datetimeFigureOut">
               <a:rPr lang="en-US" smtClean="0"/>
-              <a:t>4/11/2025</a:t>
+              <a:t>4/12/2025</a:t>
             </a:fld>
             <a:endParaRPr lang="en-US" dirty="0"/>
           </a:p>
@@ -2837,7 +2837,7 @@
           <a:p>
             <a:fld id="{06E713BE-B739-4CC0-B4CE-95E82AEB026E}" type="datetimeFigureOut">
               <a:rPr lang="en-US" smtClean="0"/>
-              <a:t>4/11/2025</a:t>
+              <a:t>4/12/2025</a:t>
             </a:fld>
             <a:endParaRPr lang="en-US" dirty="0"/>
           </a:p>
@@ -3125,7 +3125,7 @@
           <a:p>
             <a:fld id="{06E713BE-B739-4CC0-B4CE-95E82AEB026E}" type="datetimeFigureOut">
               <a:rPr lang="en-US" smtClean="0"/>
-              <a:t>4/11/2025</a:t>
+              <a:t>4/12/2025</a:t>
             </a:fld>
             <a:endParaRPr lang="en-US" dirty="0"/>
           </a:p>
@@ -3366,7 +3366,7 @@
           <a:p>
             <a:fld id="{06E713BE-B739-4CC0-B4CE-95E82AEB026E}" type="datetimeFigureOut">
               <a:rPr lang="en-US" smtClean="0"/>
-              <a:t>4/11/2025</a:t>
+              <a:t>4/12/2025</a:t>
             </a:fld>
             <a:endParaRPr lang="en-US" dirty="0"/>
           </a:p>
@@ -3903,7 +3903,7 @@
         </p:nvSpPr>
         <p:spPr>
           <a:xfrm>
-            <a:off x="1894840" y="2049304"/>
+            <a:off x="1894840" y="2510860"/>
             <a:ext cx="8402320" cy="461665"/>
           </a:xfrm>
           <a:prstGeom prst="rect">
@@ -3943,7 +3943,7 @@
         <p:spPr>
           <a:xfrm>
             <a:off x="633730" y="4116307"/>
-            <a:ext cx="3348990" cy="1200329"/>
+            <a:ext cx="3348990" cy="1569660"/>
           </a:xfrm>
           <a:prstGeom prst="rect">
             <a:avLst/>
@@ -3979,6 +3979,14 @@
               <a:t>M.Tech, Ph.D.</a:t>
             </a:r>
           </a:p>
+          <a:p>
+            <a:r>
+              <a:rPr lang="en-US" sz="2400" dirty="0">
+                <a:cs typeface="Times New Roman" panose="02020603050405020304" pitchFamily="18" charset="0"/>
+              </a:rPr>
+              <a:t>HOD &amp; Professor</a:t>
+            </a:r>
+          </a:p>
         </p:txBody>
       </p:sp>
       <p:sp>
@@ -3995,8 +4003,8 @@
         </p:nvSpPr>
         <p:spPr>
           <a:xfrm>
-            <a:off x="6096000" y="4116307"/>
-            <a:ext cx="6096000" cy="1938992"/>
+            <a:off x="5567680" y="4116307"/>
+            <a:ext cx="6350000" cy="1938992"/>
           </a:xfrm>
           <a:prstGeom prst="rect">
             <a:avLst/>
@@ -4048,7 +4056,7 @@
               <a:rPr lang="en-US" sz="2400" dirty="0">
                 <a:cs typeface="Times New Roman" panose="02020603050405020304" pitchFamily="18" charset="0"/>
               </a:rPr>
-              <a:t>M. JAGADIESHESWAR 		21MD1A0440</a:t>
+              <a:t>M. K. JAGADIESHESWAR 	21MD1A0440</a:t>
             </a:r>
           </a:p>
         </p:txBody>
@@ -5295,13 +5303,13 @@
             </a:r>
             <a:r>
               <a:rPr lang="en-US" sz="3200" b="1" dirty="0"/>
-              <a:t>Ultra Sonic Sensor HC-SR104</a:t>
-            </a:r>
-          </a:p>
-        </p:txBody>
-      </p:sp>
-      <mc:AlternateContent xmlns:mc="http://schemas.openxmlformats.org/markup-compatibility/2006" xmlns:a14="http://schemas.microsoft.com/office/drawing/2010/main">
-        <mc:Choice Requires="a14">
+              <a:t>Ultra Sonic Sensor HC-SR 04</a:t>
+            </a:r>
+          </a:p>
+        </p:txBody>
+      </p:sp>
+      <mc:AlternateContent xmlns:mc="http://schemas.openxmlformats.org/markup-compatibility/2006">
+        <mc:Choice xmlns:a14="http://schemas.microsoft.com/office/drawing/2010/main" Requires="a14">
           <p:sp>
             <p:nvSpPr>
               <p:cNvPr id="2" name="TextBox 1">
@@ -5411,7 +5419,25 @@
                             <a:rPr lang="en-US" sz="2400" b="0" i="1" smtClean="0">
                               <a:latin typeface="Cambria Math" panose="02040503050406030204" pitchFamily="18" charset="0"/>
                             </a:rPr>
-                            <m:t>𝐷𝑖𝑠𝑡𝑎𝑛𝑐𝑒</m:t>
+                            <m:t>𝑇𝑖𝑚𝑒</m:t>
+                          </m:r>
+                          <m:r>
+                            <a:rPr lang="en-US" sz="2400" b="0" i="1" smtClean="0">
+                              <a:latin typeface="Cambria Math" panose="02040503050406030204" pitchFamily="18" charset="0"/>
+                            </a:rPr>
+                            <m:t> </m:t>
+                          </m:r>
+                          <m:r>
+                            <a:rPr lang="en-US" sz="2400" b="0" i="1" smtClean="0">
+                              <a:latin typeface="Cambria Math" panose="02040503050406030204" pitchFamily="18" charset="0"/>
+                            </a:rPr>
+                            <m:t>𝑡𝑎𝑘𝑒𝑛</m:t>
+                          </m:r>
+                          <m:r>
+                            <a:rPr lang="en-US" sz="2400" b="0" i="1" smtClean="0">
+                              <a:latin typeface="Cambria Math" panose="02040503050406030204" pitchFamily="18" charset="0"/>
+                            </a:rPr>
+                            <m:t> </m:t>
                           </m:r>
                         </m:num>
                         <m:den>
@@ -5438,7 +5464,7 @@
             </p:txBody>
           </p:sp>
         </mc:Choice>
-        <mc:Fallback xmlns="">
+        <mc:Fallback>
           <p:sp>
             <p:nvSpPr>
               <p:cNvPr id="2" name="TextBox 1">
@@ -5500,6 +5526,44 @@
         <p:blipFill>
           <a:blip r:embed="rId3">
             <a:extLst>
+              <a:ext uri="{BEBA8EAE-BF5A-486C-A8C5-ECC9F3942E4B}">
+                <a14:imgProps xmlns:a14="http://schemas.microsoft.com/office/drawing/2010/main">
+                  <a14:imgLayer r:embed="rId4">
+                    <a14:imgEffect>
+                      <a14:backgroundRemoval t="9778" b="89778" l="5778" r="94667">
+                        <a14:foregroundMark x1="7556" y1="40889" x2="7556" y2="40889"/>
+                        <a14:foregroundMark x1="93333" y1="44000" x2="93333" y2="44000"/>
+                        <a14:foregroundMark x1="34222" y1="30667" x2="34222" y2="30667"/>
+                        <a14:foregroundMark x1="6222" y1="29333" x2="6222" y2="29333"/>
+                        <a14:foregroundMark x1="94667" y1="29333" x2="94667" y2="29333"/>
+                        <a14:foregroundMark x1="57778" y1="70667" x2="57778" y2="70667"/>
+                        <a14:foregroundMark x1="58222" y1="73778" x2="58222" y2="73778"/>
+                        <a14:foregroundMark x1="58222" y1="77778" x2="58222" y2="77778"/>
+                        <a14:foregroundMark x1="42649" y1="72444" x2="43556" y2="80000"/>
+                        <a14:foregroundMark x1="42222" y1="68889" x2="42649" y2="72444"/>
+                        <a14:foregroundMark x1="40858" y1="72444" x2="43556" y2="82222"/>
+                        <a14:foregroundMark x1="40000" y1="69333" x2="40858" y2="72444"/>
+                        <a14:foregroundMark x1="48000" y1="72444" x2="48000" y2="79556"/>
+                        <a14:foregroundMark x1="48000" y1="70667" x2="48000" y2="72444"/>
+                        <a14:foregroundMark x1="52271" y1="72444" x2="52889" y2="79556"/>
+                        <a14:foregroundMark x1="52000" y1="69333" x2="52271" y2="72444"/>
+                        <a14:foregroundMark x1="58222" y1="70667" x2="58222" y2="80889"/>
+                        <a14:foregroundMark x1="62222" y1="72000" x2="43111" y2="80000"/>
+                        <a14:foregroundMark x1="43111" y1="80000" x2="42222" y2="80444"/>
+                        <a14:foregroundMark x1="40000" y1="80000" x2="59556" y2="80444"/>
+                        <a14:foregroundMark x1="46502" y1="72444" x2="45778" y2="72000"/>
+                        <a14:foregroundMark x1="59556" y1="80444" x2="46502" y2="72444"/>
+                        <a14:foregroundMark x1="45605" y1="72444" x2="42667" y2="80000"/>
+                        <a14:foregroundMark x1="45778" y1="72000" x2="45605" y2="72444"/>
+                        <a14:foregroundMark x1="62222" y1="74222" x2="60444" y2="80444"/>
+                        <a14:backgroundMark x1="16444" y1="20889" x2="16444" y2="20889"/>
+                        <a14:backgroundMark x1="28444" y1="76000" x2="28444" y2="76000"/>
+                        <a14:backgroundMark x1="44889" y1="72444" x2="44889" y2="72444"/>
+                      </a14:backgroundRemoval>
+                    </a14:imgEffect>
+                  </a14:imgLayer>
+                </a14:imgProps>
+              </a:ext>
               <a:ext uri="{28A0092B-C50C-407E-A947-70E740481C1C}">
                 <a14:useLocalDpi xmlns:a14="http://schemas.microsoft.com/office/drawing/2010/main" val="0"/>
               </a:ext>
@@ -10320,7 +10384,7 @@
         </p:nvSpPr>
         <p:spPr>
           <a:xfrm>
-            <a:off x="528320" y="1752600"/>
+            <a:off x="543560" y="1803400"/>
             <a:ext cx="11104880" cy="3785652"/>
           </a:xfrm>
           <a:prstGeom prst="rect">

</xml_diff>

<commit_message>
cd files, word,ppt updated
</commit_message>
<xml_diff>
--- a/Batch 8 .pptx
+++ b/Batch 8 .pptx
@@ -5,7 +5,7 @@
     <p:sldMasterId id="2147483706" r:id="rId1"/>
   </p:sldMasterIdLst>
   <p:notesMasterIdLst>
-    <p:notesMasterId r:id="rId24"/>
+    <p:notesMasterId r:id="rId27"/>
   </p:notesMasterIdLst>
   <p:sldIdLst>
     <p:sldId id="256" r:id="rId2"/>
@@ -23,13 +23,16 @@
     <p:sldId id="267" r:id="rId14"/>
     <p:sldId id="268" r:id="rId15"/>
     <p:sldId id="269" r:id="rId16"/>
-    <p:sldId id="276" r:id="rId17"/>
-    <p:sldId id="270" r:id="rId18"/>
-    <p:sldId id="271" r:id="rId19"/>
-    <p:sldId id="277" r:id="rId20"/>
-    <p:sldId id="278" r:id="rId21"/>
-    <p:sldId id="274" r:id="rId22"/>
-    <p:sldId id="279" r:id="rId23"/>
+    <p:sldId id="280" r:id="rId17"/>
+    <p:sldId id="281" r:id="rId18"/>
+    <p:sldId id="276" r:id="rId19"/>
+    <p:sldId id="270" r:id="rId20"/>
+    <p:sldId id="271" r:id="rId21"/>
+    <p:sldId id="277" r:id="rId22"/>
+    <p:sldId id="278" r:id="rId23"/>
+    <p:sldId id="274" r:id="rId24"/>
+    <p:sldId id="279" r:id="rId25"/>
+    <p:sldId id="282" r:id="rId26"/>
   </p:sldIdLst>
   <p:sldSz cx="12192000" cy="6858000"/>
   <p:notesSz cx="6858000" cy="9144000"/>
@@ -218,7 +221,7 @@
           <a:p>
             <a:fld id="{97AC54EF-F27B-4F5F-8C1D-285B121E0FF0}" type="datetimeFigureOut">
               <a:rPr lang="en-US" smtClean="0"/>
-              <a:t>4/12/2025</a:t>
+              <a:t>4/14/2025</a:t>
             </a:fld>
             <a:endParaRPr lang="en-US"/>
           </a:p>
@@ -559,6 +562,174 @@
     </p:spTree>
     <p:extLst>
       <p:ext uri="{BB962C8B-B14F-4D97-AF65-F5344CB8AC3E}">
+        <p14:creationId xmlns:p14="http://schemas.microsoft.com/office/powerpoint/2010/main" val="3238297766"/>
+      </p:ext>
+    </p:extLst>
+  </p:cSld>
+  <p:clrMapOvr>
+    <a:masterClrMapping/>
+  </p:clrMapOvr>
+</p:notes>
+</file>
+
+<file path=ppt/notesSlides/notesSlide2.xml><?xml version="1.0" encoding="utf-8"?>
+<p:notes xmlns:a="http://schemas.openxmlformats.org/drawingml/2006/main" xmlns:r="http://schemas.openxmlformats.org/officeDocument/2006/relationships" xmlns:p="http://schemas.openxmlformats.org/presentationml/2006/main">
+  <p:cSld>
+    <p:spTree>
+      <p:nvGrpSpPr>
+        <p:cNvPr id="1" name=""/>
+        <p:cNvGrpSpPr/>
+        <p:nvPr/>
+      </p:nvGrpSpPr>
+      <p:grpSpPr>
+        <a:xfrm>
+          <a:off x="0" y="0"/>
+          <a:ext cx="0" cy="0"/>
+          <a:chOff x="0" y="0"/>
+          <a:chExt cx="0" cy="0"/>
+        </a:xfrm>
+      </p:grpSpPr>
+      <p:sp>
+        <p:nvSpPr>
+          <p:cNvPr id="2" name="Slide Image Placeholder 1"/>
+          <p:cNvSpPr>
+            <a:spLocks noGrp="1" noRot="1" noChangeAspect="1"/>
+          </p:cNvSpPr>
+          <p:nvPr>
+            <p:ph type="sldImg"/>
+          </p:nvPr>
+        </p:nvSpPr>
+        <p:spPr/>
+      </p:sp>
+      <p:sp>
+        <p:nvSpPr>
+          <p:cNvPr id="3" name="Notes Placeholder 2"/>
+          <p:cNvSpPr>
+            <a:spLocks noGrp="1"/>
+          </p:cNvSpPr>
+          <p:nvPr>
+            <p:ph type="body" idx="1"/>
+          </p:nvPr>
+        </p:nvSpPr>
+        <p:spPr/>
+        <p:txBody>
+          <a:bodyPr/>
+          <a:lstStyle/>
+          <a:p>
+            <a:endParaRPr lang="en-US" dirty="0"/>
+          </a:p>
+        </p:txBody>
+      </p:sp>
+      <p:sp>
+        <p:nvSpPr>
+          <p:cNvPr id="4" name="Slide Number Placeholder 3"/>
+          <p:cNvSpPr>
+            <a:spLocks noGrp="1"/>
+          </p:cNvSpPr>
+          <p:nvPr>
+            <p:ph type="sldNum" sz="quarter" idx="5"/>
+          </p:nvPr>
+        </p:nvSpPr>
+        <p:spPr/>
+        <p:txBody>
+          <a:bodyPr/>
+          <a:lstStyle/>
+          <a:p>
+            <a:fld id="{F12B1DAD-8ADF-4263-94C3-359392852796}" type="slidenum">
+              <a:rPr lang="en-US" smtClean="0"/>
+              <a:t>17</a:t>
+            </a:fld>
+            <a:endParaRPr lang="en-US"/>
+          </a:p>
+        </p:txBody>
+      </p:sp>
+    </p:spTree>
+    <p:extLst>
+      <p:ext uri="{BB962C8B-B14F-4D97-AF65-F5344CB8AC3E}">
+        <p14:creationId xmlns:p14="http://schemas.microsoft.com/office/powerpoint/2010/main" val="3510318947"/>
+      </p:ext>
+    </p:extLst>
+  </p:cSld>
+  <p:clrMapOvr>
+    <a:masterClrMapping/>
+  </p:clrMapOvr>
+</p:notes>
+</file>
+
+<file path=ppt/notesSlides/notesSlide3.xml><?xml version="1.0" encoding="utf-8"?>
+<p:notes xmlns:a="http://schemas.openxmlformats.org/drawingml/2006/main" xmlns:r="http://schemas.openxmlformats.org/officeDocument/2006/relationships" xmlns:p="http://schemas.openxmlformats.org/presentationml/2006/main">
+  <p:cSld>
+    <p:spTree>
+      <p:nvGrpSpPr>
+        <p:cNvPr id="1" name=""/>
+        <p:cNvGrpSpPr/>
+        <p:nvPr/>
+      </p:nvGrpSpPr>
+      <p:grpSpPr>
+        <a:xfrm>
+          <a:off x="0" y="0"/>
+          <a:ext cx="0" cy="0"/>
+          <a:chOff x="0" y="0"/>
+          <a:chExt cx="0" cy="0"/>
+        </a:xfrm>
+      </p:grpSpPr>
+      <p:sp>
+        <p:nvSpPr>
+          <p:cNvPr id="2" name="Slide Image Placeholder 1"/>
+          <p:cNvSpPr>
+            <a:spLocks noGrp="1" noRot="1" noChangeAspect="1"/>
+          </p:cNvSpPr>
+          <p:nvPr>
+            <p:ph type="sldImg"/>
+          </p:nvPr>
+        </p:nvSpPr>
+        <p:spPr/>
+      </p:sp>
+      <p:sp>
+        <p:nvSpPr>
+          <p:cNvPr id="3" name="Notes Placeholder 2"/>
+          <p:cNvSpPr>
+            <a:spLocks noGrp="1"/>
+          </p:cNvSpPr>
+          <p:nvPr>
+            <p:ph type="body" idx="1"/>
+          </p:nvPr>
+        </p:nvSpPr>
+        <p:spPr/>
+        <p:txBody>
+          <a:bodyPr/>
+          <a:lstStyle/>
+          <a:p>
+            <a:endParaRPr lang="en-US" dirty="0"/>
+          </a:p>
+        </p:txBody>
+      </p:sp>
+      <p:sp>
+        <p:nvSpPr>
+          <p:cNvPr id="4" name="Slide Number Placeholder 3"/>
+          <p:cNvSpPr>
+            <a:spLocks noGrp="1"/>
+          </p:cNvSpPr>
+          <p:nvPr>
+            <p:ph type="sldNum" sz="quarter" idx="5"/>
+          </p:nvPr>
+        </p:nvSpPr>
+        <p:spPr/>
+        <p:txBody>
+          <a:bodyPr/>
+          <a:lstStyle/>
+          <a:p>
+            <a:fld id="{F12B1DAD-8ADF-4263-94C3-359392852796}" type="slidenum">
+              <a:rPr lang="en-US" smtClean="0"/>
+              <a:t>18</a:t>
+            </a:fld>
+            <a:endParaRPr lang="en-US"/>
+          </a:p>
+        </p:txBody>
+      </p:sp>
+    </p:spTree>
+    <p:extLst>
+      <p:ext uri="{BB962C8B-B14F-4D97-AF65-F5344CB8AC3E}">
         <p14:creationId xmlns:p14="http://schemas.microsoft.com/office/powerpoint/2010/main" val="887938242"/>
       </p:ext>
     </p:extLst>
@@ -716,7 +887,7 @@
           <a:p>
             <a:fld id="{06E713BE-B739-4CC0-B4CE-95E82AEB026E}" type="datetimeFigureOut">
               <a:rPr lang="en-US" smtClean="0"/>
-              <a:t>4/12/2025</a:t>
+              <a:t>4/14/2025</a:t>
             </a:fld>
             <a:endParaRPr lang="en-US" dirty="0"/>
           </a:p>
@@ -914,7 +1085,7 @@
           <a:p>
             <a:fld id="{06E713BE-B739-4CC0-B4CE-95E82AEB026E}" type="datetimeFigureOut">
               <a:rPr lang="en-US" smtClean="0"/>
-              <a:t>4/12/2025</a:t>
+              <a:t>4/14/2025</a:t>
             </a:fld>
             <a:endParaRPr lang="en-US" dirty="0"/>
           </a:p>
@@ -1122,7 +1293,7 @@
           <a:p>
             <a:fld id="{06E713BE-B739-4CC0-B4CE-95E82AEB026E}" type="datetimeFigureOut">
               <a:rPr lang="en-US" smtClean="0"/>
-              <a:t>4/12/2025</a:t>
+              <a:t>4/14/2025</a:t>
             </a:fld>
             <a:endParaRPr lang="en-US" dirty="0"/>
           </a:p>
@@ -1320,7 +1491,7 @@
           <a:p>
             <a:fld id="{06E713BE-B739-4CC0-B4CE-95E82AEB026E}" type="datetimeFigureOut">
               <a:rPr lang="en-US" smtClean="0"/>
-              <a:t>4/12/2025</a:t>
+              <a:t>4/14/2025</a:t>
             </a:fld>
             <a:endParaRPr lang="en-US" dirty="0"/>
           </a:p>
@@ -1595,7 +1766,7 @@
           <a:p>
             <a:fld id="{06E713BE-B739-4CC0-B4CE-95E82AEB026E}" type="datetimeFigureOut">
               <a:rPr lang="en-US" smtClean="0"/>
-              <a:t>4/12/2025</a:t>
+              <a:t>4/14/2025</a:t>
             </a:fld>
             <a:endParaRPr lang="en-US" dirty="0"/>
           </a:p>
@@ -1860,7 +2031,7 @@
           <a:p>
             <a:fld id="{06E713BE-B739-4CC0-B4CE-95E82AEB026E}" type="datetimeFigureOut">
               <a:rPr lang="en-US" smtClean="0"/>
-              <a:t>4/12/2025</a:t>
+              <a:t>4/14/2025</a:t>
             </a:fld>
             <a:endParaRPr lang="en-US" dirty="0"/>
           </a:p>
@@ -2272,7 +2443,7 @@
           <a:p>
             <a:fld id="{06E713BE-B739-4CC0-B4CE-95E82AEB026E}" type="datetimeFigureOut">
               <a:rPr lang="en-US" smtClean="0"/>
-              <a:t>4/12/2025</a:t>
+              <a:t>4/14/2025</a:t>
             </a:fld>
             <a:endParaRPr lang="en-US" dirty="0"/>
           </a:p>
@@ -2413,7 +2584,7 @@
           <a:p>
             <a:fld id="{06E713BE-B739-4CC0-B4CE-95E82AEB026E}" type="datetimeFigureOut">
               <a:rPr lang="en-US" smtClean="0"/>
-              <a:t>4/12/2025</a:t>
+              <a:t>4/14/2025</a:t>
             </a:fld>
             <a:endParaRPr lang="en-US" dirty="0"/>
           </a:p>
@@ -2526,7 +2697,7 @@
           <a:p>
             <a:fld id="{06E713BE-B739-4CC0-B4CE-95E82AEB026E}" type="datetimeFigureOut">
               <a:rPr lang="en-US" smtClean="0"/>
-              <a:t>4/12/2025</a:t>
+              <a:t>4/14/2025</a:t>
             </a:fld>
             <a:endParaRPr lang="en-US" dirty="0"/>
           </a:p>
@@ -2837,7 +3008,7 @@
           <a:p>
             <a:fld id="{06E713BE-B739-4CC0-B4CE-95E82AEB026E}" type="datetimeFigureOut">
               <a:rPr lang="en-US" smtClean="0"/>
-              <a:t>4/12/2025</a:t>
+              <a:t>4/14/2025</a:t>
             </a:fld>
             <a:endParaRPr lang="en-US" dirty="0"/>
           </a:p>
@@ -3125,7 +3296,7 @@
           <a:p>
             <a:fld id="{06E713BE-B739-4CC0-B4CE-95E82AEB026E}" type="datetimeFigureOut">
               <a:rPr lang="en-US" smtClean="0"/>
-              <a:t>4/12/2025</a:t>
+              <a:t>4/14/2025</a:t>
             </a:fld>
             <a:endParaRPr lang="en-US" dirty="0"/>
           </a:p>
@@ -3366,7 +3537,7 @@
           <a:p>
             <a:fld id="{06E713BE-B739-4CC0-B4CE-95E82AEB026E}" type="datetimeFigureOut">
               <a:rPr lang="en-US" smtClean="0"/>
-              <a:t>4/12/2025</a:t>
+              <a:t>4/14/2025</a:t>
             </a:fld>
             <a:endParaRPr lang="en-US" dirty="0"/>
           </a:p>
@@ -3903,7 +4074,7 @@
         </p:nvSpPr>
         <p:spPr>
           <a:xfrm>
-            <a:off x="1894840" y="2510860"/>
+            <a:off x="1894840" y="2256199"/>
             <a:ext cx="8402320" cy="461665"/>
           </a:xfrm>
           <a:prstGeom prst="rect">
@@ -3919,144 +4090,183 @@
           <a:p>
             <a:pPr algn="ctr"/>
             <a:r>
+              <a:rPr lang="en-US" sz="2400" b="1" dirty="0">
+                <a:latin typeface="Arial" panose="020B0604020202020204" pitchFamily="34" charset="0"/>
+                <a:cs typeface="Arial" panose="020B0604020202020204" pitchFamily="34" charset="0"/>
+              </a:rPr>
+              <a:t>Department of </a:t>
+            </a:r>
+          </a:p>
+        </p:txBody>
+      </p:sp>
+      <p:sp>
+        <p:nvSpPr>
+          <p:cNvPr id="5" name="TextBox 4">
+            <a:extLst>
+              <a:ext uri="{FF2B5EF4-FFF2-40B4-BE49-F238E27FC236}">
+                <a16:creationId xmlns:a16="http://schemas.microsoft.com/office/drawing/2014/main" id="{E20B0A40-D484-44AC-19B4-B5DA138AAB7E}"/>
+              </a:ext>
+            </a:extLst>
+          </p:cNvPr>
+          <p:cNvSpPr txBox="1"/>
+          <p:nvPr/>
+        </p:nvSpPr>
+        <p:spPr>
+          <a:xfrm>
+            <a:off x="633730" y="4116307"/>
+            <a:ext cx="3348990" cy="1569660"/>
+          </a:xfrm>
+          <a:prstGeom prst="rect">
+            <a:avLst/>
+          </a:prstGeom>
+          <a:noFill/>
+        </p:spPr>
+        <p:txBody>
+          <a:bodyPr wrap="square" rtlCol="0">
+            <a:spAutoFit/>
+          </a:bodyPr>
+          <a:lstStyle/>
+          <a:p>
+            <a:r>
+              <a:rPr lang="en-US" sz="2400" b="1" dirty="0">
+                <a:cs typeface="Times New Roman" panose="02020603050405020304" pitchFamily="18" charset="0"/>
+              </a:rPr>
+              <a:t>Under the Guidance of</a:t>
+            </a:r>
+          </a:p>
+          <a:p>
+            <a:r>
+              <a:rPr lang="en-US" sz="2400" dirty="0">
+                <a:cs typeface="Times New Roman" panose="02020603050405020304" pitchFamily="18" charset="0"/>
+              </a:rPr>
+              <a:t>Dr. CH. SURYABABU,</a:t>
+            </a:r>
+          </a:p>
+          <a:p>
+            <a:r>
+              <a:rPr lang="en-US" sz="2400" dirty="0">
+                <a:cs typeface="Times New Roman" panose="02020603050405020304" pitchFamily="18" charset="0"/>
+              </a:rPr>
+              <a:t>M.Tech, Ph.D.</a:t>
+            </a:r>
+          </a:p>
+          <a:p>
+            <a:r>
+              <a:rPr lang="en-US" sz="2400" dirty="0">
+                <a:cs typeface="Times New Roman" panose="02020603050405020304" pitchFamily="18" charset="0"/>
+              </a:rPr>
+              <a:t>HOD &amp; Professor</a:t>
+            </a:r>
+          </a:p>
+        </p:txBody>
+      </p:sp>
+      <p:sp>
+        <p:nvSpPr>
+          <p:cNvPr id="6" name="TextBox 5">
+            <a:extLst>
+              <a:ext uri="{FF2B5EF4-FFF2-40B4-BE49-F238E27FC236}">
+                <a16:creationId xmlns:a16="http://schemas.microsoft.com/office/drawing/2014/main" id="{5D03C4C9-EDC5-24D3-4AF9-620A472F2588}"/>
+              </a:ext>
+            </a:extLst>
+          </p:cNvPr>
+          <p:cNvSpPr txBox="1"/>
+          <p:nvPr/>
+        </p:nvSpPr>
+        <p:spPr>
+          <a:xfrm>
+            <a:off x="5567680" y="4116307"/>
+            <a:ext cx="6350000" cy="1938992"/>
+          </a:xfrm>
+          <a:prstGeom prst="rect">
+            <a:avLst/>
+          </a:prstGeom>
+          <a:noFill/>
+        </p:spPr>
+        <p:txBody>
+          <a:bodyPr wrap="square" rtlCol="0">
+            <a:spAutoFit/>
+          </a:bodyPr>
+          <a:lstStyle/>
+          <a:p>
+            <a:r>
+              <a:rPr lang="en-US" sz="2400" b="1" dirty="0">
+                <a:cs typeface="Times New Roman" panose="02020603050405020304" pitchFamily="18" charset="0"/>
+              </a:rPr>
+              <a:t>PRESENTED BY:</a:t>
+            </a:r>
+            <a:br>
+              <a:rPr lang="en-US" sz="2400" dirty="0">
+                <a:cs typeface="Times New Roman" panose="02020603050405020304" pitchFamily="18" charset="0"/>
+              </a:rPr>
+            </a:br>
+            <a:r>
+              <a:rPr lang="en-US" sz="2400" dirty="0">
+                <a:cs typeface="Times New Roman" panose="02020603050405020304" pitchFamily="18" charset="0"/>
+              </a:rPr>
+              <a:t>J. DHEERAJ			21MD1A0429</a:t>
+            </a:r>
+          </a:p>
+          <a:p>
+            <a:r>
+              <a:rPr lang="en-US" sz="2400" dirty="0">
+                <a:cs typeface="Times New Roman" panose="02020603050405020304" pitchFamily="18" charset="0"/>
+              </a:rPr>
+              <a:t>G. BHARATH CHANDU		21MD1A0422</a:t>
+            </a:r>
+          </a:p>
+          <a:p>
+            <a:r>
+              <a:rPr lang="en-US" sz="2400" dirty="0">
+                <a:cs typeface="Times New Roman" panose="02020603050405020304" pitchFamily="18" charset="0"/>
+              </a:rPr>
+              <a:t>N. SATISH CHANDRA 		22MD5A0407</a:t>
+            </a:r>
+          </a:p>
+          <a:p>
+            <a:r>
+              <a:rPr lang="en-US" sz="2400" dirty="0">
+                <a:cs typeface="Times New Roman" panose="02020603050405020304" pitchFamily="18" charset="0"/>
+              </a:rPr>
+              <a:t>M. K. JAGADIESHESWAR 	21MD1A0440</a:t>
+            </a:r>
+          </a:p>
+        </p:txBody>
+      </p:sp>
+      <p:sp>
+        <p:nvSpPr>
+          <p:cNvPr id="7" name="TextBox 6">
+            <a:extLst>
+              <a:ext uri="{FF2B5EF4-FFF2-40B4-BE49-F238E27FC236}">
+                <a16:creationId xmlns:a16="http://schemas.microsoft.com/office/drawing/2014/main" id="{364E74E1-29DB-2F50-7D15-0CB04631B879}"/>
+              </a:ext>
+            </a:extLst>
+          </p:cNvPr>
+          <p:cNvSpPr txBox="1"/>
+          <p:nvPr/>
+        </p:nvSpPr>
+        <p:spPr>
+          <a:xfrm>
+            <a:off x="2047240" y="2791831"/>
+            <a:ext cx="8402320" cy="461665"/>
+          </a:xfrm>
+          <a:prstGeom prst="rect">
+            <a:avLst/>
+          </a:prstGeom>
+          <a:noFill/>
+        </p:spPr>
+        <p:txBody>
+          <a:bodyPr wrap="square" rtlCol="0">
+            <a:spAutoFit/>
+          </a:bodyPr>
+          <a:lstStyle/>
+          <a:p>
+            <a:pPr algn="ctr"/>
+            <a:r>
               <a:rPr lang="en-US" sz="2400" dirty="0">
                 <a:latin typeface="Arial" panose="020B0604020202020204" pitchFamily="34" charset="0"/>
                 <a:cs typeface="Arial" panose="020B0604020202020204" pitchFamily="34" charset="0"/>
               </a:rPr>
               <a:t>ELECTRONICS AND COMMUNICATION ENGINEERING </a:t>
-            </a:r>
-          </a:p>
-        </p:txBody>
-      </p:sp>
-      <p:sp>
-        <p:nvSpPr>
-          <p:cNvPr id="5" name="TextBox 4">
-            <a:extLst>
-              <a:ext uri="{FF2B5EF4-FFF2-40B4-BE49-F238E27FC236}">
-                <a16:creationId xmlns:a16="http://schemas.microsoft.com/office/drawing/2014/main" id="{E20B0A40-D484-44AC-19B4-B5DA138AAB7E}"/>
-              </a:ext>
-            </a:extLst>
-          </p:cNvPr>
-          <p:cNvSpPr txBox="1"/>
-          <p:nvPr/>
-        </p:nvSpPr>
-        <p:spPr>
-          <a:xfrm>
-            <a:off x="633730" y="4116307"/>
-            <a:ext cx="3348990" cy="1569660"/>
-          </a:xfrm>
-          <a:prstGeom prst="rect">
-            <a:avLst/>
-          </a:prstGeom>
-          <a:noFill/>
-        </p:spPr>
-        <p:txBody>
-          <a:bodyPr wrap="square" rtlCol="0">
-            <a:spAutoFit/>
-          </a:bodyPr>
-          <a:lstStyle/>
-          <a:p>
-            <a:r>
-              <a:rPr lang="en-US" sz="2400" b="1" dirty="0">
-                <a:cs typeface="Times New Roman" panose="02020603050405020304" pitchFamily="18" charset="0"/>
-              </a:rPr>
-              <a:t>Under the Guidance of</a:t>
-            </a:r>
-          </a:p>
-          <a:p>
-            <a:r>
-              <a:rPr lang="en-US" sz="2400" dirty="0">
-                <a:cs typeface="Times New Roman" panose="02020603050405020304" pitchFamily="18" charset="0"/>
-              </a:rPr>
-              <a:t>Dr. CH. SURYABABU,</a:t>
-            </a:r>
-          </a:p>
-          <a:p>
-            <a:r>
-              <a:rPr lang="en-US" sz="2400" dirty="0">
-                <a:cs typeface="Times New Roman" panose="02020603050405020304" pitchFamily="18" charset="0"/>
-              </a:rPr>
-              <a:t>M.Tech, Ph.D.</a:t>
-            </a:r>
-          </a:p>
-          <a:p>
-            <a:r>
-              <a:rPr lang="en-US" sz="2400" dirty="0">
-                <a:cs typeface="Times New Roman" panose="02020603050405020304" pitchFamily="18" charset="0"/>
-              </a:rPr>
-              <a:t>HOD &amp; Professor</a:t>
-            </a:r>
-          </a:p>
-        </p:txBody>
-      </p:sp>
-      <p:sp>
-        <p:nvSpPr>
-          <p:cNvPr id="6" name="TextBox 5">
-            <a:extLst>
-              <a:ext uri="{FF2B5EF4-FFF2-40B4-BE49-F238E27FC236}">
-                <a16:creationId xmlns:a16="http://schemas.microsoft.com/office/drawing/2014/main" id="{5D03C4C9-EDC5-24D3-4AF9-620A472F2588}"/>
-              </a:ext>
-            </a:extLst>
-          </p:cNvPr>
-          <p:cNvSpPr txBox="1"/>
-          <p:nvPr/>
-        </p:nvSpPr>
-        <p:spPr>
-          <a:xfrm>
-            <a:off x="5567680" y="4116307"/>
-            <a:ext cx="6350000" cy="1938992"/>
-          </a:xfrm>
-          <a:prstGeom prst="rect">
-            <a:avLst/>
-          </a:prstGeom>
-          <a:noFill/>
-        </p:spPr>
-        <p:txBody>
-          <a:bodyPr wrap="square" rtlCol="0">
-            <a:spAutoFit/>
-          </a:bodyPr>
-          <a:lstStyle/>
-          <a:p>
-            <a:r>
-              <a:rPr lang="en-US" sz="2400" b="1" dirty="0">
-                <a:cs typeface="Times New Roman" panose="02020603050405020304" pitchFamily="18" charset="0"/>
-              </a:rPr>
-              <a:t>PRESENTED BY:</a:t>
-            </a:r>
-            <a:br>
-              <a:rPr lang="en-US" sz="2400" dirty="0">
-                <a:cs typeface="Times New Roman" panose="02020603050405020304" pitchFamily="18" charset="0"/>
-              </a:rPr>
-            </a:br>
-            <a:r>
-              <a:rPr lang="en-US" sz="2400" dirty="0">
-                <a:cs typeface="Times New Roman" panose="02020603050405020304" pitchFamily="18" charset="0"/>
-              </a:rPr>
-              <a:t>J. DHEERAJ			21MD1A0429</a:t>
-            </a:r>
-          </a:p>
-          <a:p>
-            <a:r>
-              <a:rPr lang="en-US" sz="2400" dirty="0">
-                <a:cs typeface="Times New Roman" panose="02020603050405020304" pitchFamily="18" charset="0"/>
-              </a:rPr>
-              <a:t>G. BHARATH CHANDU		21MD1A0422</a:t>
-            </a:r>
-          </a:p>
-          <a:p>
-            <a:r>
-              <a:rPr lang="en-US" sz="2400" dirty="0">
-                <a:cs typeface="Times New Roman" panose="02020603050405020304" pitchFamily="18" charset="0"/>
-              </a:rPr>
-              <a:t>N. SATISH CHANDRA 		22MD5A0407</a:t>
-            </a:r>
-          </a:p>
-          <a:p>
-            <a:r>
-              <a:rPr lang="en-US" sz="2400" dirty="0">
-                <a:cs typeface="Times New Roman" panose="02020603050405020304" pitchFamily="18" charset="0"/>
-              </a:rPr>
-              <a:t>M. K. JAGADIESHESWAR 	21MD1A0440</a:t>
             </a:r>
           </a:p>
         </p:txBody>
@@ -5308,8 +5518,8 @@
           </a:p>
         </p:txBody>
       </p:sp>
-      <mc:AlternateContent xmlns:mc="http://schemas.openxmlformats.org/markup-compatibility/2006">
-        <mc:Choice xmlns:a14="http://schemas.microsoft.com/office/drawing/2010/main" Requires="a14">
+      <mc:AlternateContent xmlns:mc="http://schemas.openxmlformats.org/markup-compatibility/2006" xmlns:a14="http://schemas.microsoft.com/office/drawing/2010/main">
+        <mc:Choice Requires="a14">
           <p:sp>
             <p:nvSpPr>
               <p:cNvPr id="2" name="TextBox 1">
@@ -5464,7 +5674,7 @@
             </p:txBody>
           </p:sp>
         </mc:Choice>
-        <mc:Fallback>
+        <mc:Fallback xmlns="">
           <p:sp>
             <p:nvSpPr>
               <p:cNvPr id="2" name="TextBox 1">
@@ -5937,6 +6147,622 @@
 </file>
 
 <file path=ppt/slides/slide16.xml><?xml version="1.0" encoding="utf-8"?>
+<p:sld xmlns:a="http://schemas.openxmlformats.org/drawingml/2006/main" xmlns:r="http://schemas.openxmlformats.org/officeDocument/2006/relationships" xmlns:p="http://schemas.openxmlformats.org/presentationml/2006/main">
+  <p:cSld>
+    <p:spTree>
+      <p:nvGrpSpPr>
+        <p:cNvPr id="1" name=""/>
+        <p:cNvGrpSpPr/>
+        <p:nvPr/>
+      </p:nvGrpSpPr>
+      <p:grpSpPr>
+        <a:xfrm>
+          <a:off x="0" y="0"/>
+          <a:ext cx="0" cy="0"/>
+          <a:chOff x="0" y="0"/>
+          <a:chExt cx="0" cy="0"/>
+        </a:xfrm>
+      </p:grpSpPr>
+      <p:sp>
+        <p:nvSpPr>
+          <p:cNvPr id="4" name="TextBox 3">
+            <a:extLst>
+              <a:ext uri="{FF2B5EF4-FFF2-40B4-BE49-F238E27FC236}">
+                <a16:creationId xmlns:a16="http://schemas.microsoft.com/office/drawing/2014/main" id="{17C97D89-3979-D9EC-2F9E-F1BA5D0A9EF4}"/>
+              </a:ext>
+            </a:extLst>
+          </p:cNvPr>
+          <p:cNvSpPr txBox="1"/>
+          <p:nvPr/>
+        </p:nvSpPr>
+        <p:spPr>
+          <a:xfrm>
+            <a:off x="416560" y="675640"/>
+            <a:ext cx="4856480" cy="646331"/>
+          </a:xfrm>
+          <a:prstGeom prst="rect">
+            <a:avLst/>
+          </a:prstGeom>
+          <a:noFill/>
+        </p:spPr>
+        <p:txBody>
+          <a:bodyPr wrap="square" rtlCol="0">
+            <a:spAutoFit/>
+          </a:bodyPr>
+          <a:lstStyle/>
+          <a:p>
+            <a:r>
+              <a:rPr lang="en-US" sz="3600" b="1" dirty="0"/>
+              <a:t>System Components </a:t>
+            </a:r>
+          </a:p>
+        </p:txBody>
+      </p:sp>
+      <p:cxnSp>
+        <p:nvCxnSpPr>
+          <p:cNvPr id="9" name="Straight Connector 8">
+            <a:extLst>
+              <a:ext uri="{FF2B5EF4-FFF2-40B4-BE49-F238E27FC236}">
+                <a16:creationId xmlns:a16="http://schemas.microsoft.com/office/drawing/2014/main" id="{06DEB5C5-95DE-9DEC-6F84-929E462EC78F}"/>
+              </a:ext>
+            </a:extLst>
+          </p:cNvPr>
+          <p:cNvCxnSpPr>
+            <a:cxnSpLocks/>
+          </p:cNvCxnSpPr>
+          <p:nvPr/>
+        </p:nvCxnSpPr>
+        <p:spPr>
+          <a:xfrm>
+            <a:off x="335280" y="1382931"/>
+            <a:ext cx="2743200" cy="0"/>
+          </a:xfrm>
+          <a:prstGeom prst="line">
+            <a:avLst/>
+          </a:prstGeom>
+          <a:ln w="28575"/>
+          <a:effectLst>
+            <a:outerShdw blurRad="50800" dist="38100" dir="2700000" algn="tl" rotWithShape="0">
+              <a:prstClr val="black">
+                <a:alpha val="40000"/>
+              </a:prstClr>
+            </a:outerShdw>
+          </a:effectLst>
+        </p:spPr>
+        <p:style>
+          <a:lnRef idx="1">
+            <a:schemeClr val="accent1"/>
+          </a:lnRef>
+          <a:fillRef idx="0">
+            <a:schemeClr val="accent1"/>
+          </a:fillRef>
+          <a:effectRef idx="0">
+            <a:schemeClr val="accent1"/>
+          </a:effectRef>
+          <a:fontRef idx="minor">
+            <a:schemeClr val="tx1"/>
+          </a:fontRef>
+        </p:style>
+      </p:cxnSp>
+      <p:sp>
+        <p:nvSpPr>
+          <p:cNvPr id="10" name="TextBox 9">
+            <a:extLst>
+              <a:ext uri="{FF2B5EF4-FFF2-40B4-BE49-F238E27FC236}">
+                <a16:creationId xmlns:a16="http://schemas.microsoft.com/office/drawing/2014/main" id="{603D59D7-9A28-C65D-5390-DFAD2739FC7B}"/>
+              </a:ext>
+            </a:extLst>
+          </p:cNvPr>
+          <p:cNvSpPr txBox="1"/>
+          <p:nvPr/>
+        </p:nvSpPr>
+        <p:spPr>
+          <a:xfrm>
+            <a:off x="675640" y="1577955"/>
+            <a:ext cx="5908040" cy="584775"/>
+          </a:xfrm>
+          <a:prstGeom prst="rect">
+            <a:avLst/>
+          </a:prstGeom>
+          <a:noFill/>
+        </p:spPr>
+        <p:txBody>
+          <a:bodyPr wrap="square" rtlCol="0">
+            <a:spAutoFit/>
+          </a:bodyPr>
+          <a:lstStyle/>
+          <a:p>
+            <a:r>
+              <a:rPr lang="en-US" sz="3200" b="1" dirty="0"/>
+              <a:t>7.</a:t>
+            </a:r>
+            <a:r>
+              <a:rPr lang="en-US" sz="3200" b="1" dirty="0">
+                <a:latin typeface="+mj-lt"/>
+              </a:rPr>
+              <a:t> </a:t>
+            </a:r>
+            <a:r>
+              <a:rPr lang="en-US" sz="3200" b="1" dirty="0"/>
+              <a:t>LCD display</a:t>
+            </a:r>
+          </a:p>
+        </p:txBody>
+      </p:sp>
+      <p:sp>
+        <p:nvSpPr>
+          <p:cNvPr id="2" name="TextBox 1">
+            <a:extLst>
+              <a:ext uri="{FF2B5EF4-FFF2-40B4-BE49-F238E27FC236}">
+                <a16:creationId xmlns:a16="http://schemas.microsoft.com/office/drawing/2014/main" id="{636B8627-F01B-E63B-487A-512E6920E32E}"/>
+              </a:ext>
+            </a:extLst>
+          </p:cNvPr>
+          <p:cNvSpPr txBox="1"/>
+          <p:nvPr/>
+        </p:nvSpPr>
+        <p:spPr>
+          <a:xfrm>
+            <a:off x="955040" y="2357753"/>
+            <a:ext cx="6746240" cy="3816429"/>
+          </a:xfrm>
+          <a:prstGeom prst="rect">
+            <a:avLst/>
+          </a:prstGeom>
+          <a:noFill/>
+        </p:spPr>
+        <p:txBody>
+          <a:bodyPr wrap="square" rtlCol="0">
+            <a:spAutoFit/>
+          </a:bodyPr>
+          <a:lstStyle/>
+          <a:p>
+            <a:pPr marL="342900" indent="-342900">
+              <a:buFont typeface="Arial" panose="020B0604020202020204" pitchFamily="34" charset="0"/>
+              <a:buChar char="•"/>
+            </a:pPr>
+            <a:r>
+              <a:rPr lang="en-US" sz="2200" b="1" dirty="0">
+                <a:latin typeface="+mj-lt"/>
+              </a:rPr>
+              <a:t>Size:</a:t>
+            </a:r>
+            <a:r>
+              <a:rPr lang="en-US" sz="2200" dirty="0">
+                <a:latin typeface="+mj-lt"/>
+              </a:rPr>
+              <a:t> A 16x2 LCD display can show up to 32 characters (16 per row).</a:t>
+            </a:r>
+          </a:p>
+          <a:p>
+            <a:pPr marL="342900" indent="-342900">
+              <a:buFont typeface="Arial" panose="020B0604020202020204" pitchFamily="34" charset="0"/>
+              <a:buChar char="•"/>
+            </a:pPr>
+            <a:r>
+              <a:rPr lang="en-US" sz="2200" b="1" dirty="0">
+                <a:latin typeface="+mj-lt"/>
+              </a:rPr>
+              <a:t>Operation Modes: </a:t>
+            </a:r>
+            <a:r>
+              <a:rPr lang="en-US" sz="2200" dirty="0">
+                <a:latin typeface="+mj-lt"/>
+              </a:rPr>
+              <a:t>Supports both 4-bit and 8-bit communication modes for flexibility in microcontroller connections.</a:t>
+            </a:r>
+          </a:p>
+          <a:p>
+            <a:pPr marL="342900" indent="-342900">
+              <a:buFont typeface="Arial" panose="020B0604020202020204" pitchFamily="34" charset="0"/>
+              <a:buChar char="•"/>
+            </a:pPr>
+            <a:r>
+              <a:rPr lang="en-US" sz="2200" b="1" dirty="0">
+                <a:latin typeface="+mj-lt"/>
+              </a:rPr>
+              <a:t>Backlight:</a:t>
+            </a:r>
+            <a:r>
+              <a:rPr lang="en-US" sz="2200" dirty="0">
+                <a:latin typeface="+mj-lt"/>
+              </a:rPr>
+              <a:t> Equipped with an LED backlight for better visibility in low-light environments.</a:t>
+            </a:r>
+          </a:p>
+          <a:p>
+            <a:pPr marL="342900" indent="-342900">
+              <a:buFont typeface="Arial" panose="020B0604020202020204" pitchFamily="34" charset="0"/>
+              <a:buChar char="•"/>
+            </a:pPr>
+            <a:r>
+              <a:rPr lang="en-US" sz="2200" b="1" dirty="0">
+                <a:latin typeface="+mj-lt"/>
+              </a:rPr>
+              <a:t>Contrast Adjustment: </a:t>
+            </a:r>
+            <a:r>
+              <a:rPr lang="en-US" sz="2200" dirty="0">
+                <a:latin typeface="+mj-lt"/>
+              </a:rPr>
+              <a:t>Includes a pin (V0) for connecting a potentiometer to adjust screen contrast.</a:t>
+            </a:r>
+          </a:p>
+          <a:p>
+            <a:pPr marL="342900" indent="-342900">
+              <a:buFont typeface="Arial" panose="020B0604020202020204" pitchFamily="34" charset="0"/>
+              <a:buChar char="•"/>
+            </a:pPr>
+            <a:r>
+              <a:rPr lang="en-US" sz="2200" b="1" dirty="0">
+                <a:latin typeface="+mj-lt"/>
+              </a:rPr>
+              <a:t>Applications: </a:t>
+            </a:r>
+            <a:r>
+              <a:rPr lang="en-US" sz="2200" dirty="0">
+                <a:latin typeface="+mj-lt"/>
+              </a:rPr>
+              <a:t>Widely used in embedded systems, consumer electronics, and industrial machines.</a:t>
+            </a:r>
+          </a:p>
+        </p:txBody>
+      </p:sp>
+      <p:pic>
+        <p:nvPicPr>
+          <p:cNvPr id="1028" name="Picture 4" descr="16x2 LCD DISPLAY - PiEmbSysTech">
+            <a:extLst>
+              <a:ext uri="{FF2B5EF4-FFF2-40B4-BE49-F238E27FC236}">
+                <a16:creationId xmlns:a16="http://schemas.microsoft.com/office/drawing/2014/main" id="{78042CDB-E169-8618-34B6-086B07738D66}"/>
+              </a:ext>
+            </a:extLst>
+          </p:cNvPr>
+          <p:cNvPicPr>
+            <a:picLocks noChangeAspect="1" noChangeArrowheads="1"/>
+          </p:cNvPicPr>
+          <p:nvPr/>
+        </p:nvPicPr>
+        <p:blipFill>
+          <a:blip r:embed="rId3">
+            <a:extLst>
+              <a:ext uri="{28A0092B-C50C-407E-A947-70E740481C1C}">
+                <a14:useLocalDpi xmlns:a14="http://schemas.microsoft.com/office/drawing/2010/main" val="0"/>
+              </a:ext>
+            </a:extLst>
+          </a:blip>
+          <a:srcRect/>
+          <a:stretch>
+            <a:fillRect/>
+          </a:stretch>
+        </p:blipFill>
+        <p:spPr bwMode="auto">
+          <a:xfrm>
+            <a:off x="7884160" y="2608230"/>
+            <a:ext cx="4071548" cy="2011680"/>
+          </a:xfrm>
+          <a:prstGeom prst="rect">
+            <a:avLst/>
+          </a:prstGeom>
+          <a:noFill/>
+          <a:extLst>
+            <a:ext uri="{909E8E84-426E-40DD-AFC4-6F175D3DCCD1}">
+              <a14:hiddenFill xmlns:a14="http://schemas.microsoft.com/office/drawing/2010/main">
+                <a:solidFill>
+                  <a:srgbClr val="FFFFFF"/>
+                </a:solidFill>
+              </a14:hiddenFill>
+            </a:ext>
+          </a:extLst>
+        </p:spPr>
+      </p:pic>
+    </p:spTree>
+    <p:extLst>
+      <p:ext uri="{BB962C8B-B14F-4D97-AF65-F5344CB8AC3E}">
+        <p14:creationId xmlns:p14="http://schemas.microsoft.com/office/powerpoint/2010/main" val="2356941805"/>
+      </p:ext>
+    </p:extLst>
+  </p:cSld>
+  <p:clrMapOvr>
+    <a:masterClrMapping/>
+  </p:clrMapOvr>
+</p:sld>
+</file>
+
+<file path=ppt/slides/slide17.xml><?xml version="1.0" encoding="utf-8"?>
+<p:sld xmlns:a="http://schemas.openxmlformats.org/drawingml/2006/main" xmlns:r="http://schemas.openxmlformats.org/officeDocument/2006/relationships" xmlns:p="http://schemas.openxmlformats.org/presentationml/2006/main">
+  <p:cSld>
+    <p:spTree>
+      <p:nvGrpSpPr>
+        <p:cNvPr id="1" name=""/>
+        <p:cNvGrpSpPr/>
+        <p:nvPr/>
+      </p:nvGrpSpPr>
+      <p:grpSpPr>
+        <a:xfrm>
+          <a:off x="0" y="0"/>
+          <a:ext cx="0" cy="0"/>
+          <a:chOff x="0" y="0"/>
+          <a:chExt cx="0" cy="0"/>
+        </a:xfrm>
+      </p:grpSpPr>
+      <p:sp>
+        <p:nvSpPr>
+          <p:cNvPr id="4" name="TextBox 3">
+            <a:extLst>
+              <a:ext uri="{FF2B5EF4-FFF2-40B4-BE49-F238E27FC236}">
+                <a16:creationId xmlns:a16="http://schemas.microsoft.com/office/drawing/2014/main" id="{17C97D89-3979-D9EC-2F9E-F1BA5D0A9EF4}"/>
+              </a:ext>
+            </a:extLst>
+          </p:cNvPr>
+          <p:cNvSpPr txBox="1"/>
+          <p:nvPr/>
+        </p:nvSpPr>
+        <p:spPr>
+          <a:xfrm>
+            <a:off x="416560" y="675640"/>
+            <a:ext cx="4856480" cy="646331"/>
+          </a:xfrm>
+          <a:prstGeom prst="rect">
+            <a:avLst/>
+          </a:prstGeom>
+          <a:noFill/>
+        </p:spPr>
+        <p:txBody>
+          <a:bodyPr wrap="square" rtlCol="0">
+            <a:spAutoFit/>
+          </a:bodyPr>
+          <a:lstStyle/>
+          <a:p>
+            <a:r>
+              <a:rPr lang="en-US" sz="3600" b="1" dirty="0"/>
+              <a:t>System Components </a:t>
+            </a:r>
+          </a:p>
+        </p:txBody>
+      </p:sp>
+      <p:cxnSp>
+        <p:nvCxnSpPr>
+          <p:cNvPr id="9" name="Straight Connector 8">
+            <a:extLst>
+              <a:ext uri="{FF2B5EF4-FFF2-40B4-BE49-F238E27FC236}">
+                <a16:creationId xmlns:a16="http://schemas.microsoft.com/office/drawing/2014/main" id="{06DEB5C5-95DE-9DEC-6F84-929E462EC78F}"/>
+              </a:ext>
+            </a:extLst>
+          </p:cNvPr>
+          <p:cNvCxnSpPr>
+            <a:cxnSpLocks/>
+          </p:cNvCxnSpPr>
+          <p:nvPr/>
+        </p:nvCxnSpPr>
+        <p:spPr>
+          <a:xfrm>
+            <a:off x="335280" y="1382931"/>
+            <a:ext cx="2743200" cy="0"/>
+          </a:xfrm>
+          <a:prstGeom prst="line">
+            <a:avLst/>
+          </a:prstGeom>
+          <a:ln w="28575"/>
+          <a:effectLst>
+            <a:outerShdw blurRad="50800" dist="38100" dir="2700000" algn="tl" rotWithShape="0">
+              <a:prstClr val="black">
+                <a:alpha val="40000"/>
+              </a:prstClr>
+            </a:outerShdw>
+          </a:effectLst>
+        </p:spPr>
+        <p:style>
+          <a:lnRef idx="1">
+            <a:schemeClr val="accent1"/>
+          </a:lnRef>
+          <a:fillRef idx="0">
+            <a:schemeClr val="accent1"/>
+          </a:fillRef>
+          <a:effectRef idx="0">
+            <a:schemeClr val="accent1"/>
+          </a:effectRef>
+          <a:fontRef idx="minor">
+            <a:schemeClr val="tx1"/>
+          </a:fontRef>
+        </p:style>
+      </p:cxnSp>
+      <p:sp>
+        <p:nvSpPr>
+          <p:cNvPr id="10" name="TextBox 9">
+            <a:extLst>
+              <a:ext uri="{FF2B5EF4-FFF2-40B4-BE49-F238E27FC236}">
+                <a16:creationId xmlns:a16="http://schemas.microsoft.com/office/drawing/2014/main" id="{603D59D7-9A28-C65D-5390-DFAD2739FC7B}"/>
+              </a:ext>
+            </a:extLst>
+          </p:cNvPr>
+          <p:cNvSpPr txBox="1"/>
+          <p:nvPr/>
+        </p:nvSpPr>
+        <p:spPr>
+          <a:xfrm>
+            <a:off x="675640" y="1577955"/>
+            <a:ext cx="5908040" cy="584775"/>
+          </a:xfrm>
+          <a:prstGeom prst="rect">
+            <a:avLst/>
+          </a:prstGeom>
+          <a:noFill/>
+        </p:spPr>
+        <p:txBody>
+          <a:bodyPr wrap="square" rtlCol="0">
+            <a:spAutoFit/>
+          </a:bodyPr>
+          <a:lstStyle/>
+          <a:p>
+            <a:r>
+              <a:rPr lang="en-US" sz="3200" b="1" dirty="0"/>
+              <a:t>8.</a:t>
+            </a:r>
+            <a:r>
+              <a:rPr lang="en-US" sz="3200" b="1" dirty="0">
+                <a:latin typeface="+mj-lt"/>
+              </a:rPr>
+              <a:t> </a:t>
+            </a:r>
+            <a:r>
+              <a:rPr lang="en-US" sz="3200" b="1" dirty="0"/>
+              <a:t>Transformer</a:t>
+            </a:r>
+          </a:p>
+        </p:txBody>
+      </p:sp>
+      <p:sp>
+        <p:nvSpPr>
+          <p:cNvPr id="2" name="TextBox 1">
+            <a:extLst>
+              <a:ext uri="{FF2B5EF4-FFF2-40B4-BE49-F238E27FC236}">
+                <a16:creationId xmlns:a16="http://schemas.microsoft.com/office/drawing/2014/main" id="{636B8627-F01B-E63B-487A-512E6920E32E}"/>
+              </a:ext>
+            </a:extLst>
+          </p:cNvPr>
+          <p:cNvSpPr txBox="1"/>
+          <p:nvPr/>
+        </p:nvSpPr>
+        <p:spPr>
+          <a:xfrm>
+            <a:off x="955040" y="2357753"/>
+            <a:ext cx="6746240" cy="3785652"/>
+          </a:xfrm>
+          <a:prstGeom prst="rect">
+            <a:avLst/>
+          </a:prstGeom>
+          <a:noFill/>
+        </p:spPr>
+        <p:txBody>
+          <a:bodyPr wrap="square" rtlCol="0">
+            <a:spAutoFit/>
+          </a:bodyPr>
+          <a:lstStyle/>
+          <a:p>
+            <a:r>
+              <a:rPr lang="en-US" sz="2400" dirty="0">
+                <a:latin typeface="+mj-lt"/>
+              </a:rPr>
+              <a:t>A </a:t>
+            </a:r>
+            <a:r>
+              <a:rPr lang="en-US" sz="2400" b="1" dirty="0">
+                <a:latin typeface="+mj-lt"/>
+              </a:rPr>
+              <a:t>12-0-12 center-tapped transformer</a:t>
+            </a:r>
+            <a:r>
+              <a:rPr lang="en-US" sz="2400" dirty="0">
+                <a:latin typeface="+mj-lt"/>
+              </a:rPr>
+              <a:t> is a type of step-down transformer commonly used in electronics projects.</a:t>
+            </a:r>
+          </a:p>
+          <a:p>
+            <a:endParaRPr lang="en-US" sz="2400" dirty="0"/>
+          </a:p>
+          <a:p>
+            <a:pPr marL="342900" indent="-342900">
+              <a:buFont typeface="Arial" panose="020B0604020202020204" pitchFamily="34" charset="0"/>
+              <a:buChar char="•"/>
+            </a:pPr>
+            <a:r>
+              <a:rPr lang="en-US" sz="2400" b="1" dirty="0">
+                <a:latin typeface="+mj-lt"/>
+              </a:rPr>
+              <a:t>Primary Voltage</a:t>
+            </a:r>
+            <a:r>
+              <a:rPr lang="en-US" sz="2400" dirty="0">
+                <a:latin typeface="+mj-lt"/>
+              </a:rPr>
+              <a:t>: Typically operates at 220V or 230V AC input.</a:t>
+            </a:r>
+          </a:p>
+          <a:p>
+            <a:pPr marL="342900" indent="-342900">
+              <a:buFont typeface="Arial" panose="020B0604020202020204" pitchFamily="34" charset="0"/>
+              <a:buChar char="•"/>
+            </a:pPr>
+            <a:r>
+              <a:rPr lang="en-US" sz="2400" b="1" dirty="0">
+                <a:latin typeface="+mj-lt"/>
+              </a:rPr>
+              <a:t>Secondary Voltage</a:t>
+            </a:r>
+            <a:r>
+              <a:rPr lang="en-US" sz="2400" dirty="0">
+                <a:latin typeface="+mj-lt"/>
+              </a:rPr>
+              <a:t>: Provides three output voltages: 12V, 0V (center tap), and another 12V. The voltage across the two outer terminals is 24V AC.</a:t>
+            </a:r>
+          </a:p>
+          <a:p>
+            <a:endParaRPr lang="en-US" sz="2400" dirty="0"/>
+          </a:p>
+        </p:txBody>
+      </p:sp>
+      <p:pic>
+        <p:nvPicPr>
+          <p:cNvPr id="1026" name="Picture 2" descr="12-0-12 12V 1A Center Tapped Step Down Transformer : Amazon.in: Toys &amp; Games">
+            <a:extLst>
+              <a:ext uri="{FF2B5EF4-FFF2-40B4-BE49-F238E27FC236}">
+                <a16:creationId xmlns:a16="http://schemas.microsoft.com/office/drawing/2014/main" id="{C0212761-FECB-C888-8001-52907E226943}"/>
+              </a:ext>
+            </a:extLst>
+          </p:cNvPr>
+          <p:cNvPicPr>
+            <a:picLocks noChangeAspect="1" noChangeArrowheads="1"/>
+          </p:cNvPicPr>
+          <p:nvPr/>
+        </p:nvPicPr>
+        <p:blipFill>
+          <a:blip r:embed="rId3">
+            <a:extLst>
+              <a:ext uri="{28A0092B-C50C-407E-A947-70E740481C1C}">
+                <a14:useLocalDpi xmlns:a14="http://schemas.microsoft.com/office/drawing/2010/main" val="0"/>
+              </a:ext>
+            </a:extLst>
+          </a:blip>
+          <a:srcRect/>
+          <a:stretch>
+            <a:fillRect/>
+          </a:stretch>
+        </p:blipFill>
+        <p:spPr bwMode="auto">
+          <a:xfrm>
+            <a:off x="8432800" y="2357753"/>
+            <a:ext cx="3423920" cy="2523257"/>
+          </a:xfrm>
+          <a:prstGeom prst="rect">
+            <a:avLst/>
+          </a:prstGeom>
+          <a:noFill/>
+          <a:extLst>
+            <a:ext uri="{909E8E84-426E-40DD-AFC4-6F175D3DCCD1}">
+              <a14:hiddenFill xmlns:a14="http://schemas.microsoft.com/office/drawing/2010/main">
+                <a:solidFill>
+                  <a:srgbClr val="FFFFFF"/>
+                </a:solidFill>
+              </a14:hiddenFill>
+            </a:ext>
+          </a:extLst>
+        </p:spPr>
+      </p:pic>
+    </p:spTree>
+    <p:extLst>
+      <p:ext uri="{BB962C8B-B14F-4D97-AF65-F5344CB8AC3E}">
+        <p14:creationId xmlns:p14="http://schemas.microsoft.com/office/powerpoint/2010/main" val="3173803684"/>
+      </p:ext>
+    </p:extLst>
+  </p:cSld>
+  <p:clrMapOvr>
+    <a:masterClrMapping/>
+  </p:clrMapOvr>
+</p:sld>
+</file>
+
+<file path=ppt/slides/slide18.xml><?xml version="1.0" encoding="utf-8"?>
 <p:sld xmlns:a="http://schemas.openxmlformats.org/drawingml/2006/main" xmlns:r="http://schemas.openxmlformats.org/officeDocument/2006/relationships" xmlns:p="http://schemas.openxmlformats.org/presentationml/2006/main">
   <p:cSld>
     <p:spTree>
@@ -8261,7 +9087,7 @@
 </p:sld>
 </file>
 
-<file path=ppt/slides/slide17.xml><?xml version="1.0" encoding="utf-8"?>
+<file path=ppt/slides/slide19.xml><?xml version="1.0" encoding="utf-8"?>
 <p:sld xmlns:a="http://schemas.openxmlformats.org/drawingml/2006/main" xmlns:r="http://schemas.openxmlformats.org/officeDocument/2006/relationships" xmlns:p="http://schemas.openxmlformats.org/presentationml/2006/main">
   <p:cSld>
     <p:spTree>
@@ -8487,7 +9313,184 @@
 </p:sld>
 </file>
 
-<file path=ppt/slides/slide18.xml><?xml version="1.0" encoding="utf-8"?>
+<file path=ppt/slides/slide2.xml><?xml version="1.0" encoding="utf-8"?>
+<p:sld xmlns:a="http://schemas.openxmlformats.org/drawingml/2006/main" xmlns:r="http://schemas.openxmlformats.org/officeDocument/2006/relationships" xmlns:p="http://schemas.openxmlformats.org/presentationml/2006/main">
+  <p:cSld>
+    <p:spTree>
+      <p:nvGrpSpPr>
+        <p:cNvPr id="1" name=""/>
+        <p:cNvGrpSpPr/>
+        <p:nvPr/>
+      </p:nvGrpSpPr>
+      <p:grpSpPr>
+        <a:xfrm>
+          <a:off x="0" y="0"/>
+          <a:ext cx="0" cy="0"/>
+          <a:chOff x="0" y="0"/>
+          <a:chExt cx="0" cy="0"/>
+        </a:xfrm>
+      </p:grpSpPr>
+      <p:sp>
+        <p:nvSpPr>
+          <p:cNvPr id="4" name="TextBox 3">
+            <a:extLst>
+              <a:ext uri="{FF2B5EF4-FFF2-40B4-BE49-F238E27FC236}">
+                <a16:creationId xmlns:a16="http://schemas.microsoft.com/office/drawing/2014/main" id="{17C97D89-3979-D9EC-2F9E-F1BA5D0A9EF4}"/>
+              </a:ext>
+            </a:extLst>
+          </p:cNvPr>
+          <p:cNvSpPr txBox="1"/>
+          <p:nvPr/>
+        </p:nvSpPr>
+        <p:spPr>
+          <a:xfrm>
+            <a:off x="721360" y="695960"/>
+            <a:ext cx="1351280" cy="646331"/>
+          </a:xfrm>
+          <a:prstGeom prst="rect">
+            <a:avLst/>
+          </a:prstGeom>
+          <a:noFill/>
+        </p:spPr>
+        <p:txBody>
+          <a:bodyPr wrap="square" rtlCol="0">
+            <a:spAutoFit/>
+          </a:bodyPr>
+          <a:lstStyle/>
+          <a:p>
+            <a:r>
+              <a:rPr lang="en-US" sz="3600" b="1" dirty="0"/>
+              <a:t>TITLE</a:t>
+            </a:r>
+          </a:p>
+        </p:txBody>
+      </p:sp>
+      <p:cxnSp>
+        <p:nvCxnSpPr>
+          <p:cNvPr id="9" name="Straight Connector 8">
+            <a:extLst>
+              <a:ext uri="{FF2B5EF4-FFF2-40B4-BE49-F238E27FC236}">
+                <a16:creationId xmlns:a16="http://schemas.microsoft.com/office/drawing/2014/main" id="{06DEB5C5-95DE-9DEC-6F84-929E462EC78F}"/>
+              </a:ext>
+            </a:extLst>
+          </p:cNvPr>
+          <p:cNvCxnSpPr/>
+          <p:nvPr/>
+        </p:nvCxnSpPr>
+        <p:spPr>
+          <a:xfrm>
+            <a:off x="355600" y="1382931"/>
+            <a:ext cx="1828800" cy="0"/>
+          </a:xfrm>
+          <a:prstGeom prst="line">
+            <a:avLst/>
+          </a:prstGeom>
+          <a:ln w="28575"/>
+          <a:effectLst>
+            <a:outerShdw blurRad="50800" dist="38100" dir="2700000" algn="tl" rotWithShape="0">
+              <a:prstClr val="black">
+                <a:alpha val="40000"/>
+              </a:prstClr>
+            </a:outerShdw>
+          </a:effectLst>
+        </p:spPr>
+        <p:style>
+          <a:lnRef idx="1">
+            <a:schemeClr val="accent1"/>
+          </a:lnRef>
+          <a:fillRef idx="0">
+            <a:schemeClr val="accent1"/>
+          </a:fillRef>
+          <a:effectRef idx="0">
+            <a:schemeClr val="accent1"/>
+          </a:effectRef>
+          <a:fontRef idx="minor">
+            <a:schemeClr val="tx1"/>
+          </a:fontRef>
+        </p:style>
+      </p:cxnSp>
+      <p:sp>
+        <p:nvSpPr>
+          <p:cNvPr id="10" name="TextBox 9">
+            <a:extLst>
+              <a:ext uri="{FF2B5EF4-FFF2-40B4-BE49-F238E27FC236}">
+                <a16:creationId xmlns:a16="http://schemas.microsoft.com/office/drawing/2014/main" id="{603D59D7-9A28-C65D-5390-DFAD2739FC7B}"/>
+              </a:ext>
+            </a:extLst>
+          </p:cNvPr>
+          <p:cNvSpPr txBox="1"/>
+          <p:nvPr/>
+        </p:nvSpPr>
+        <p:spPr>
+          <a:xfrm>
+            <a:off x="670560" y="2459504"/>
+            <a:ext cx="6522720" cy="2308324"/>
+          </a:xfrm>
+          <a:prstGeom prst="rect">
+            <a:avLst/>
+          </a:prstGeom>
+          <a:noFill/>
+        </p:spPr>
+        <p:txBody>
+          <a:bodyPr wrap="square" rtlCol="0">
+            <a:spAutoFit/>
+          </a:bodyPr>
+          <a:lstStyle/>
+          <a:p>
+            <a:r>
+              <a:rPr lang="en-US" sz="3600" b="1" dirty="0">
+                <a:latin typeface="+mj-lt"/>
+                <a:cs typeface="Times New Roman" panose="02020603050405020304" pitchFamily="18" charset="0"/>
+              </a:rPr>
+              <a:t>Mean Based Approach To Omnidirectional Pathfinding Algorithm Using Single Ultrasonic Sensor for Robotic Car</a:t>
+            </a:r>
+          </a:p>
+        </p:txBody>
+      </p:sp>
+      <p:pic>
+        <p:nvPicPr>
+          <p:cNvPr id="13" name="Picture 12">
+            <a:extLst>
+              <a:ext uri="{FF2B5EF4-FFF2-40B4-BE49-F238E27FC236}">
+                <a16:creationId xmlns:a16="http://schemas.microsoft.com/office/drawing/2014/main" id="{CFD124E6-63D7-8D3A-1091-87D4B848AF4D}"/>
+              </a:ext>
+            </a:extLst>
+          </p:cNvPr>
+          <p:cNvPicPr>
+            <a:picLocks noChangeAspect="1"/>
+          </p:cNvPicPr>
+          <p:nvPr/>
+        </p:nvPicPr>
+        <p:blipFill>
+          <a:blip r:embed="rId2"/>
+          <a:stretch>
+            <a:fillRect/>
+          </a:stretch>
+        </p:blipFill>
+        <p:spPr>
+          <a:xfrm>
+            <a:off x="7193280" y="2247264"/>
+            <a:ext cx="4460240" cy="3300095"/>
+          </a:xfrm>
+          <a:prstGeom prst="rect">
+            <a:avLst/>
+          </a:prstGeom>
+        </p:spPr>
+      </p:pic>
+    </p:spTree>
+    <p:extLst>
+      <p:ext uri="{BB962C8B-B14F-4D97-AF65-F5344CB8AC3E}">
+        <p14:creationId xmlns:p14="http://schemas.microsoft.com/office/powerpoint/2010/main" val="550662415"/>
+      </p:ext>
+    </p:extLst>
+  </p:cSld>
+  <p:clrMapOvr>
+    <a:masterClrMapping/>
+  </p:clrMapOvr>
+</p:sld>
+</file>
+
+<file path=ppt/slides/slide20.xml><?xml version="1.0" encoding="utf-8"?>
 <p:sld xmlns:a="http://schemas.openxmlformats.org/drawingml/2006/main" xmlns:r="http://schemas.openxmlformats.org/officeDocument/2006/relationships" xmlns:p="http://schemas.openxmlformats.org/presentationml/2006/main">
   <p:cSld>
     <p:spTree>
@@ -9635,7 +10638,7 @@
 </p:sld>
 </file>
 
-<file path=ppt/slides/slide19.xml><?xml version="1.0" encoding="utf-8"?>
+<file path=ppt/slides/slide21.xml><?xml version="1.0" encoding="utf-8"?>
 <p:sld xmlns:a="http://schemas.openxmlformats.org/drawingml/2006/main" xmlns:r="http://schemas.openxmlformats.org/officeDocument/2006/relationships" xmlns:p="http://schemas.openxmlformats.org/presentationml/2006/main">
   <p:cSld>
     <p:spTree>
@@ -9858,7 +10861,7 @@
 </p:sld>
 </file>
 
-<file path=ppt/slides/slide2.xml><?xml version="1.0" encoding="utf-8"?>
+<file path=ppt/slides/slide22.xml><?xml version="1.0" encoding="utf-8"?>
 <p:sld xmlns:a="http://schemas.openxmlformats.org/drawingml/2006/main" xmlns:r="http://schemas.openxmlformats.org/officeDocument/2006/relationships" xmlns:p="http://schemas.openxmlformats.org/presentationml/2006/main">
   <p:cSld>
     <p:spTree>
@@ -9889,8 +10892,8 @@
         </p:nvSpPr>
         <p:spPr>
           <a:xfrm>
-            <a:off x="721360" y="695960"/>
-            <a:ext cx="1351280" cy="646331"/>
+            <a:off x="416560" y="675640"/>
+            <a:ext cx="4856480" cy="646331"/>
           </a:xfrm>
           <a:prstGeom prst="rect">
             <a:avLst/>
@@ -9905,7 +10908,7 @@
           <a:p>
             <a:r>
               <a:rPr lang="en-US" sz="3600" b="1" dirty="0"/>
-              <a:t>TITLE</a:t>
+              <a:t>Software's Used</a:t>
             </a:r>
           </a:p>
         </p:txBody>
@@ -9919,13 +10922,15 @@
               </a:ext>
             </a:extLst>
           </p:cNvPr>
-          <p:cNvCxnSpPr/>
+          <p:cNvCxnSpPr>
+            <a:cxnSpLocks/>
+          </p:cNvCxnSpPr>
           <p:nvPr/>
         </p:nvCxnSpPr>
         <p:spPr>
           <a:xfrm>
-            <a:off x="355600" y="1382931"/>
-            <a:ext cx="1828800" cy="0"/>
+            <a:off x="335280" y="1382931"/>
+            <a:ext cx="2743200" cy="0"/>
           </a:xfrm>
           <a:prstGeom prst="line">
             <a:avLst/>
@@ -9956,10 +10961,10 @@
       </p:cxnSp>
       <p:sp>
         <p:nvSpPr>
-          <p:cNvPr id="10" name="TextBox 9">
-            <a:extLst>
-              <a:ext uri="{FF2B5EF4-FFF2-40B4-BE49-F238E27FC236}">
-                <a16:creationId xmlns:a16="http://schemas.microsoft.com/office/drawing/2014/main" id="{603D59D7-9A28-C65D-5390-DFAD2739FC7B}"/>
+          <p:cNvPr id="6" name="TextBox 5">
+            <a:extLst>
+              <a:ext uri="{FF2B5EF4-FFF2-40B4-BE49-F238E27FC236}">
+                <a16:creationId xmlns:a16="http://schemas.microsoft.com/office/drawing/2014/main" id="{CF6F4F10-B955-26C4-1954-A6F002AA681F}"/>
               </a:ext>
             </a:extLst>
           </p:cNvPr>
@@ -9968,8 +10973,8 @@
         </p:nvSpPr>
         <p:spPr>
           <a:xfrm>
-            <a:off x="670560" y="2459504"/>
-            <a:ext cx="6522720" cy="2308324"/>
+            <a:off x="812800" y="1658045"/>
+            <a:ext cx="7518400" cy="5016758"/>
           </a:xfrm>
           <a:prstGeom prst="rect">
             <a:avLst/>
@@ -9983,21 +10988,73 @@
           <a:lstStyle/>
           <a:p>
             <a:r>
-              <a:rPr lang="en-US" sz="3600" b="1" dirty="0">
-                <a:latin typeface="+mj-lt"/>
-                <a:cs typeface="Times New Roman" panose="02020603050405020304" pitchFamily="18" charset="0"/>
-              </a:rPr>
-              <a:t>Mean Based Approach To Omnidirectional Pathfinding Algorithm Using Single Ultrasonic Sensor for Robotic Car</a:t>
+              <a:rPr lang="en-US" sz="2800" b="1" dirty="0"/>
+              <a:t>Proteus - ISIS</a:t>
+            </a:r>
+          </a:p>
+          <a:p>
+            <a:endParaRPr lang="en-US" sz="2800" b="1" dirty="0"/>
+          </a:p>
+          <a:p>
+            <a:pPr marL="342900" indent="-342900">
+              <a:buFont typeface="Arial" panose="020B0604020202020204" pitchFamily="34" charset="0"/>
+              <a:buChar char="•"/>
+            </a:pPr>
+            <a:r>
+              <a:rPr lang="en-US" sz="2400" dirty="0"/>
+              <a:t>Proteus ISIS (Intelligent Schematic Input System) is a tool for designing and simulating electronic circuits.</a:t>
+            </a:r>
+          </a:p>
+          <a:p>
+            <a:pPr marL="342900" indent="-342900">
+              <a:buFont typeface="Arial" panose="020B0604020202020204" pitchFamily="34" charset="0"/>
+              <a:buChar char="•"/>
+            </a:pPr>
+            <a:r>
+              <a:rPr lang="en-US" sz="2400" b="1" dirty="0"/>
+              <a:t>Features</a:t>
+            </a:r>
+            <a:r>
+              <a:rPr lang="en-US" sz="2400" dirty="0"/>
+              <a:t>: Offers a vast library of components, real-time simulation, and integration with microcontroller programming.</a:t>
+            </a:r>
+          </a:p>
+          <a:p>
+            <a:pPr marL="342900" indent="-342900">
+              <a:buFont typeface="Arial" panose="020B0604020202020204" pitchFamily="34" charset="0"/>
+              <a:buChar char="•"/>
+            </a:pPr>
+            <a:r>
+              <a:rPr lang="en-US" sz="2400" b="1" dirty="0"/>
+              <a:t>Applications</a:t>
+            </a:r>
+            <a:r>
+              <a:rPr lang="en-US" sz="2400" dirty="0"/>
+              <a:t>: Used for circuit design, testing, and educational purposes, especially in embedded systems and IoT projects.</a:t>
+            </a:r>
+          </a:p>
+          <a:p>
+            <a:pPr marL="342900" indent="-342900">
+              <a:buFont typeface="Arial" panose="020B0604020202020204" pitchFamily="34" charset="0"/>
+              <a:buChar char="•"/>
+            </a:pPr>
+            <a:r>
+              <a:rPr lang="en-US" sz="2400" b="1" dirty="0"/>
+              <a:t>Part of Proteus Suite</a:t>
+            </a:r>
+            <a:r>
+              <a:rPr lang="en-US" sz="2400" dirty="0"/>
+              <a:t>: Bundled with ARES for PCB design, making it a comprehensive electronic design solution.</a:t>
             </a:r>
           </a:p>
         </p:txBody>
       </p:sp>
       <p:pic>
         <p:nvPicPr>
-          <p:cNvPr id="13" name="Picture 12">
-            <a:extLst>
-              <a:ext uri="{FF2B5EF4-FFF2-40B4-BE49-F238E27FC236}">
-                <a16:creationId xmlns:a16="http://schemas.microsoft.com/office/drawing/2014/main" id="{CFD124E6-63D7-8D3A-1091-87D4B848AF4D}"/>
+          <p:cNvPr id="8" name="Picture 7">
+            <a:extLst>
+              <a:ext uri="{FF2B5EF4-FFF2-40B4-BE49-F238E27FC236}">
+                <a16:creationId xmlns:a16="http://schemas.microsoft.com/office/drawing/2014/main" id="{591DE59D-2701-722F-8319-159976C0634E}"/>
               </a:ext>
             </a:extLst>
           </p:cNvPr>
@@ -10007,15 +11064,21 @@
           <p:nvPr/>
         </p:nvPicPr>
         <p:blipFill>
-          <a:blip r:embed="rId2"/>
+          <a:blip r:embed="rId2">
+            <a:extLst>
+              <a:ext uri="{28A0092B-C50C-407E-A947-70E740481C1C}">
+                <a14:useLocalDpi xmlns:a14="http://schemas.microsoft.com/office/drawing/2010/main" val="0"/>
+              </a:ext>
+            </a:extLst>
+          </a:blip>
           <a:stretch>
             <a:fillRect/>
           </a:stretch>
         </p:blipFill>
         <p:spPr>
           <a:xfrm>
-            <a:off x="7193280" y="2247264"/>
-            <a:ext cx="4460240" cy="3300095"/>
+            <a:off x="8331200" y="2290816"/>
+            <a:ext cx="3657600" cy="3320327"/>
           </a:xfrm>
           <a:prstGeom prst="rect">
             <a:avLst/>
@@ -10025,7 +11088,7 @@
     </p:spTree>
     <p:extLst>
       <p:ext uri="{BB962C8B-B14F-4D97-AF65-F5344CB8AC3E}">
-        <p14:creationId xmlns:p14="http://schemas.microsoft.com/office/powerpoint/2010/main" val="550662415"/>
+        <p14:creationId xmlns:p14="http://schemas.microsoft.com/office/powerpoint/2010/main" val="3056487727"/>
       </p:ext>
     </p:extLst>
   </p:cSld>
@@ -10035,7 +11098,7 @@
 </p:sld>
 </file>
 
-<file path=ppt/slides/slide20.xml><?xml version="1.0" encoding="utf-8"?>
+<file path=ppt/slides/slide23.xml><?xml version="1.0" encoding="utf-8"?>
 <p:sld xmlns:a="http://schemas.openxmlformats.org/drawingml/2006/main" xmlns:r="http://schemas.openxmlformats.org/officeDocument/2006/relationships" xmlns:p="http://schemas.openxmlformats.org/presentationml/2006/main">
   <p:cSld>
     <p:spTree>
@@ -10067,7 +11130,7 @@
         <p:spPr>
           <a:xfrm>
             <a:off x="416560" y="675640"/>
-            <a:ext cx="4856480" cy="646331"/>
+            <a:ext cx="5679440" cy="646331"/>
           </a:xfrm>
           <a:prstGeom prst="rect">
             <a:avLst/>
@@ -10082,7 +11145,7 @@
           <a:p>
             <a:r>
               <a:rPr lang="en-US" sz="3600" b="1" dirty="0"/>
-              <a:t>Software's Used</a:t>
+              <a:t>Advantages &amp; Future Scope</a:t>
             </a:r>
           </a:p>
         </p:txBody>
@@ -10138,7 +11201,7 @@
           <p:cNvPr id="6" name="TextBox 5">
             <a:extLst>
               <a:ext uri="{FF2B5EF4-FFF2-40B4-BE49-F238E27FC236}">
-                <a16:creationId xmlns:a16="http://schemas.microsoft.com/office/drawing/2014/main" id="{CF6F4F10-B955-26C4-1954-A6F002AA681F}"/>
+                <a16:creationId xmlns:a16="http://schemas.microsoft.com/office/drawing/2014/main" id="{57CC0083-6D2E-CFA0-B34B-C13C38CC22CF}"/>
               </a:ext>
             </a:extLst>
           </p:cNvPr>
@@ -10147,8 +11210,8 @@
         </p:nvSpPr>
         <p:spPr>
           <a:xfrm>
-            <a:off x="812800" y="1658045"/>
-            <a:ext cx="7518400" cy="5016758"/>
+            <a:off x="543560" y="1803400"/>
+            <a:ext cx="11104880" cy="3785652"/>
           </a:xfrm>
           <a:prstGeom prst="rect">
             <a:avLst/>
@@ -10162,12 +11225,9 @@
           <a:lstStyle/>
           <a:p>
             <a:r>
-              <a:rPr lang="en-US" sz="2800" b="1" dirty="0"/>
-              <a:t>Proteus - ISIS</a:t>
-            </a:r>
-          </a:p>
-          <a:p>
-            <a:endParaRPr lang="en-US" sz="2800" b="1" dirty="0"/>
+              <a:rPr lang="en-US" sz="2400" b="1" dirty="0"/>
+              <a:t>Advantage:</a:t>
+            </a:r>
           </a:p>
           <a:p>
             <a:pPr marL="342900" indent="-342900">
@@ -10175,8 +11235,10 @@
               <a:buChar char="•"/>
             </a:pPr>
             <a:r>
-              <a:rPr lang="en-US" sz="2400" dirty="0"/>
-              <a:t>Proteus ISIS (Intelligent Schematic Input System) is a tool for designing and simulating electronic circuits.</a:t>
+              <a:rPr lang="en-US" sz="2400" dirty="0">
+                <a:latin typeface="+mj-lt"/>
+              </a:rPr>
+              <a:t>Enhanced Mobility</a:t>
             </a:r>
           </a:p>
           <a:p>
@@ -10185,13 +11247,14 @@
               <a:buChar char="•"/>
             </a:pPr>
             <a:r>
-              <a:rPr lang="en-US" sz="2400" b="1" dirty="0"/>
-              <a:t>Features</a:t>
-            </a:r>
-            <a:r>
-              <a:rPr lang="en-US" sz="2400" dirty="0"/>
-              <a:t>: Offers a vast library of components, real-time simulation, and integration with microcontroller programming.</a:t>
-            </a:r>
+              <a:rPr lang="en-US" sz="2400" dirty="0">
+                <a:latin typeface="+mj-lt"/>
+              </a:rPr>
+              <a:t>Time Efficiency</a:t>
+            </a:r>
+            <a:endParaRPr lang="en-US" sz="2400" b="1" dirty="0">
+              <a:latin typeface="+mj-lt"/>
+            </a:endParaRPr>
           </a:p>
           <a:p>
             <a:pPr marL="342900" indent="-342900">
@@ -10199,13 +11262,14 @@
               <a:buChar char="•"/>
             </a:pPr>
             <a:r>
-              <a:rPr lang="en-US" sz="2400" b="1" dirty="0"/>
-              <a:t>Applications</a:t>
-            </a:r>
-            <a:r>
-              <a:rPr lang="en-US" sz="2400" dirty="0"/>
-              <a:t>: Used for circuit design, testing, and educational purposes, especially in embedded systems and IoT projects.</a:t>
-            </a:r>
+              <a:rPr lang="en-US" sz="2400" dirty="0">
+                <a:latin typeface="+mj-lt"/>
+              </a:rPr>
+              <a:t>Efficient Pathfinding</a:t>
+            </a:r>
+            <a:endParaRPr lang="en-US" sz="2400" b="1" dirty="0">
+              <a:latin typeface="+mj-lt"/>
+            </a:endParaRPr>
           </a:p>
           <a:p>
             <a:pPr marL="342900" indent="-342900">
@@ -10213,56 +11277,68 @@
               <a:buChar char="•"/>
             </a:pPr>
             <a:r>
+              <a:rPr lang="en-US" sz="2400" dirty="0">
+                <a:latin typeface="+mj-lt"/>
+              </a:rPr>
+              <a:t>Energy Efficiency</a:t>
+            </a:r>
+          </a:p>
+          <a:p>
+            <a:r>
+              <a:rPr lang="en-US" sz="2400" dirty="0">
+                <a:latin typeface="+mj-lt"/>
+              </a:rPr>
+              <a:t> </a:t>
+            </a:r>
+          </a:p>
+          <a:p>
+            <a:r>
               <a:rPr lang="en-US" sz="2400" b="1" dirty="0"/>
-              <a:t>Part of Proteus Suite</a:t>
-            </a:r>
-            <a:r>
-              <a:rPr lang="en-US" sz="2400" dirty="0"/>
-              <a:t>: Bundled with ARES for PCB design, making it a comprehensive electronic design solution.</a:t>
-            </a:r>
-          </a:p>
-        </p:txBody>
-      </p:sp>
-      <p:pic>
-        <p:nvPicPr>
-          <p:cNvPr id="8" name="Picture 7">
-            <a:extLst>
-              <a:ext uri="{FF2B5EF4-FFF2-40B4-BE49-F238E27FC236}">
-                <a16:creationId xmlns:a16="http://schemas.microsoft.com/office/drawing/2014/main" id="{591DE59D-2701-722F-8319-159976C0634E}"/>
-              </a:ext>
-            </a:extLst>
-          </p:cNvPr>
-          <p:cNvPicPr>
-            <a:picLocks noChangeAspect="1"/>
-          </p:cNvPicPr>
-          <p:nvPr/>
-        </p:nvPicPr>
-        <p:blipFill>
-          <a:blip r:embed="rId2">
-            <a:extLst>
-              <a:ext uri="{28A0092B-C50C-407E-A947-70E740481C1C}">
-                <a14:useLocalDpi xmlns:a14="http://schemas.microsoft.com/office/drawing/2010/main" val="0"/>
-              </a:ext>
-            </a:extLst>
-          </a:blip>
-          <a:stretch>
-            <a:fillRect/>
-          </a:stretch>
-        </p:blipFill>
-        <p:spPr>
-          <a:xfrm>
-            <a:off x="8331200" y="2290816"/>
-            <a:ext cx="3657600" cy="3320327"/>
-          </a:xfrm>
-          <a:prstGeom prst="rect">
-            <a:avLst/>
-          </a:prstGeom>
-        </p:spPr>
-      </p:pic>
+              <a:t>Future Scopes:</a:t>
+            </a:r>
+          </a:p>
+          <a:p>
+            <a:pPr marL="342900" indent="-342900">
+              <a:buFont typeface="Arial" panose="020B0604020202020204" pitchFamily="34" charset="0"/>
+              <a:buChar char="•"/>
+            </a:pPr>
+            <a:r>
+              <a:rPr lang="en-US" sz="2400" dirty="0">
+                <a:latin typeface="+mj-lt"/>
+              </a:rPr>
+              <a:t>Disaster Response</a:t>
+            </a:r>
+          </a:p>
+          <a:p>
+            <a:pPr marL="342900" indent="-342900">
+              <a:buFont typeface="Arial" panose="020B0604020202020204" pitchFamily="34" charset="0"/>
+              <a:buChar char="•"/>
+            </a:pPr>
+            <a:r>
+              <a:rPr lang="en-US" sz="2400" dirty="0">
+                <a:latin typeface="+mj-lt"/>
+              </a:rPr>
+              <a:t>Smart Vehicles</a:t>
+            </a:r>
+          </a:p>
+          <a:p>
+            <a:pPr marL="342900" indent="-342900">
+              <a:buFont typeface="Arial" panose="020B0604020202020204" pitchFamily="34" charset="0"/>
+              <a:buChar char="•"/>
+            </a:pPr>
+            <a:r>
+              <a:rPr lang="en-US" sz="2400" dirty="0">
+                <a:latin typeface="+mj-lt"/>
+              </a:rPr>
+              <a:t>Space Exploration</a:t>
+            </a:r>
+          </a:p>
+        </p:txBody>
+      </p:sp>
     </p:spTree>
     <p:extLst>
       <p:ext uri="{BB962C8B-B14F-4D97-AF65-F5344CB8AC3E}">
-        <p14:creationId xmlns:p14="http://schemas.microsoft.com/office/powerpoint/2010/main" val="3056487727"/>
+        <p14:creationId xmlns:p14="http://schemas.microsoft.com/office/powerpoint/2010/main" val="2205597045"/>
       </p:ext>
     </p:extLst>
   </p:cSld>
@@ -10272,7 +11348,7 @@
 </p:sld>
 </file>
 
-<file path=ppt/slides/slide21.xml><?xml version="1.0" encoding="utf-8"?>
+<file path=ppt/slides/slide24.xml><?xml version="1.0" encoding="utf-8"?>
 <p:sld xmlns:a="http://schemas.openxmlformats.org/drawingml/2006/main" xmlns:r="http://schemas.openxmlformats.org/officeDocument/2006/relationships" xmlns:p="http://schemas.openxmlformats.org/presentationml/2006/main">
   <p:cSld>
     <p:spTree>
@@ -10304,7 +11380,7 @@
         <p:spPr>
           <a:xfrm>
             <a:off x="416560" y="675640"/>
-            <a:ext cx="5679440" cy="646331"/>
+            <a:ext cx="2377440" cy="640080"/>
           </a:xfrm>
           <a:prstGeom prst="rect">
             <a:avLst/>
@@ -10319,7 +11395,7 @@
           <a:p>
             <a:r>
               <a:rPr lang="en-US" sz="3600" b="1" dirty="0"/>
-              <a:t>Advantages &amp; Future Scope</a:t>
+              <a:t>Conclusion</a:t>
             </a:r>
           </a:p>
         </p:txBody>
@@ -10340,7 +11416,7 @@
         </p:nvCxnSpPr>
         <p:spPr>
           <a:xfrm>
-            <a:off x="335280" y="1382931"/>
+            <a:off x="294640" y="1321971"/>
             <a:ext cx="2743200" cy="0"/>
           </a:xfrm>
           <a:prstGeom prst="line">
@@ -10384,8 +11460,8 @@
         </p:nvSpPr>
         <p:spPr>
           <a:xfrm>
-            <a:off x="543560" y="1803400"/>
-            <a:ext cx="11104880" cy="3785652"/>
+            <a:off x="528320" y="1752600"/>
+            <a:ext cx="11104880" cy="3416320"/>
           </a:xfrm>
           <a:prstGeom prst="rect">
             <a:avLst/>
@@ -10398,121 +11474,21 @@
           </a:bodyPr>
           <a:lstStyle/>
           <a:p>
-            <a:r>
-              <a:rPr lang="en-US" sz="2400" b="1" dirty="0"/>
-              <a:t>Advantage:</a:t>
-            </a:r>
-          </a:p>
-          <a:p>
-            <a:pPr marL="342900" indent="-342900">
-              <a:buFont typeface="Arial" panose="020B0604020202020204" pitchFamily="34" charset="0"/>
-              <a:buChar char="•"/>
-            </a:pPr>
-            <a:r>
-              <a:rPr lang="en-US" sz="2400" dirty="0">
-                <a:latin typeface="+mj-lt"/>
-              </a:rPr>
-              <a:t>Enhanced Mobility</a:t>
-            </a:r>
-          </a:p>
-          <a:p>
-            <a:pPr marL="342900" indent="-342900">
-              <a:buFont typeface="Arial" panose="020B0604020202020204" pitchFamily="34" charset="0"/>
-              <a:buChar char="•"/>
-            </a:pPr>
-            <a:r>
-              <a:rPr lang="en-US" sz="2400" dirty="0">
-                <a:latin typeface="+mj-lt"/>
-              </a:rPr>
-              <a:t>Time Efficiency</a:t>
-            </a:r>
-            <a:endParaRPr lang="en-US" sz="2400" b="1" dirty="0">
+            <a:pPr algn="just"/>
+            <a:r>
+              <a:rPr lang="en-US" sz="2400" dirty="0"/>
+              <a:t>The integration of an ultrasonic sensor, servo motor, and L293D motor driver offers a sophisticated solution for autonomous robotic navigation. It enhances obstacle detection with broader coverage, ensures precise movement control, and reduces navigation errors. A mean-based algorithm improves path selection accuracy by minimizing false positives. Future developments could include AI-driven obstacle recognition, adaptive navigation through machine learning, and additional sensors for greater reliability. This innovative system is cost-effective and ideal for applications in industrial automation, autonomous vehicle navigation, and hazardous environment exploration.</a:t>
+            </a:r>
+            <a:endParaRPr lang="en-US" sz="2400" dirty="0">
               <a:latin typeface="+mj-lt"/>
             </a:endParaRPr>
-          </a:p>
-          <a:p>
-            <a:pPr marL="342900" indent="-342900">
-              <a:buFont typeface="Arial" panose="020B0604020202020204" pitchFamily="34" charset="0"/>
-              <a:buChar char="•"/>
-            </a:pPr>
-            <a:r>
-              <a:rPr lang="en-US" sz="2400" dirty="0">
-                <a:latin typeface="+mj-lt"/>
-              </a:rPr>
-              <a:t>Efficient Pathfinding</a:t>
-            </a:r>
-            <a:endParaRPr lang="en-US" sz="2400" b="1" dirty="0">
-              <a:latin typeface="+mj-lt"/>
-            </a:endParaRPr>
-          </a:p>
-          <a:p>
-            <a:pPr marL="342900" indent="-342900">
-              <a:buFont typeface="Arial" panose="020B0604020202020204" pitchFamily="34" charset="0"/>
-              <a:buChar char="•"/>
-            </a:pPr>
-            <a:r>
-              <a:rPr lang="en-US" sz="2400" dirty="0">
-                <a:latin typeface="+mj-lt"/>
-              </a:rPr>
-              <a:t>Energy Efficiency</a:t>
-            </a:r>
-          </a:p>
-          <a:p>
-            <a:r>
-              <a:rPr lang="en-US" sz="2400" dirty="0">
-                <a:latin typeface="+mj-lt"/>
-              </a:rPr>
-              <a:t> </a:t>
-            </a:r>
-          </a:p>
-          <a:p>
-            <a:r>
-              <a:rPr lang="en-US" sz="2400" b="1" dirty="0"/>
-              <a:t>Future Scopes:</a:t>
-            </a:r>
-          </a:p>
-          <a:p>
-            <a:pPr marL="342900" indent="-342900">
-              <a:buFont typeface="Arial" panose="020B0604020202020204" pitchFamily="34" charset="0"/>
-              <a:buChar char="•"/>
-            </a:pPr>
-            <a:r>
-              <a:rPr lang="en-US" sz="2400" dirty="0">
-                <a:latin typeface="+mj-lt"/>
-              </a:rPr>
-              <a:t>Disaster Response</a:t>
-            </a:r>
-          </a:p>
-          <a:p>
-            <a:pPr marL="342900" indent="-342900">
-              <a:buFont typeface="Arial" panose="020B0604020202020204" pitchFamily="34" charset="0"/>
-              <a:buChar char="•"/>
-            </a:pPr>
-            <a:r>
-              <a:rPr lang="en-US" sz="2400" dirty="0">
-                <a:latin typeface="+mj-lt"/>
-              </a:rPr>
-              <a:t>Smart Vehicles</a:t>
-            </a:r>
-          </a:p>
-          <a:p>
-            <a:pPr marL="342900" indent="-342900">
-              <a:buFont typeface="Arial" panose="020B0604020202020204" pitchFamily="34" charset="0"/>
-              <a:buChar char="•"/>
-            </a:pPr>
-            <a:r>
-              <a:rPr lang="en-US" sz="2400" dirty="0">
-                <a:latin typeface="+mj-lt"/>
-              </a:rPr>
-              <a:t>Space Exploration</a:t>
-            </a:r>
           </a:p>
         </p:txBody>
       </p:sp>
     </p:spTree>
     <p:extLst>
       <p:ext uri="{BB962C8B-B14F-4D97-AF65-F5344CB8AC3E}">
-        <p14:creationId xmlns:p14="http://schemas.microsoft.com/office/powerpoint/2010/main" val="2205597045"/>
+        <p14:creationId xmlns:p14="http://schemas.microsoft.com/office/powerpoint/2010/main" val="2342501199"/>
       </p:ext>
     </p:extLst>
   </p:cSld>
@@ -10522,7 +11498,7 @@
 </p:sld>
 </file>
 
-<file path=ppt/slides/slide22.xml><?xml version="1.0" encoding="utf-8"?>
+<file path=ppt/slides/slide25.xml><?xml version="1.0" encoding="utf-8"?>
 <p:sld xmlns:a="http://schemas.openxmlformats.org/drawingml/2006/main" xmlns:r="http://schemas.openxmlformats.org/officeDocument/2006/relationships" xmlns:p="http://schemas.openxmlformats.org/presentationml/2006/main">
   <p:cSld>
     <p:spTree>
@@ -10541,6 +11517,72 @@
       </p:grpSpPr>
       <p:sp>
         <p:nvSpPr>
+          <p:cNvPr id="2" name="Title 1">
+            <a:extLst>
+              <a:ext uri="{FF2B5EF4-FFF2-40B4-BE49-F238E27FC236}">
+                <a16:creationId xmlns:a16="http://schemas.microsoft.com/office/drawing/2014/main" id="{D13F6932-8D5D-DD6D-252A-DD6A8ECF603E}"/>
+              </a:ext>
+            </a:extLst>
+          </p:cNvPr>
+          <p:cNvSpPr>
+            <a:spLocks noGrp="1"/>
+          </p:cNvSpPr>
+          <p:nvPr>
+            <p:ph type="title"/>
+          </p:nvPr>
+        </p:nvSpPr>
+        <p:spPr>
+          <a:xfrm>
+            <a:off x="838200" y="2766219"/>
+            <a:ext cx="10515600" cy="1325563"/>
+          </a:xfrm>
+        </p:spPr>
+        <p:txBody>
+          <a:bodyPr>
+            <a:normAutofit/>
+          </a:bodyPr>
+          <a:lstStyle/>
+          <a:p>
+            <a:pPr algn="ctr"/>
+            <a:r>
+              <a:rPr lang="en-US" sz="7200" b="1" dirty="0"/>
+              <a:t>Thank you</a:t>
+            </a:r>
+          </a:p>
+        </p:txBody>
+      </p:sp>
+    </p:spTree>
+    <p:extLst>
+      <p:ext uri="{BB962C8B-B14F-4D97-AF65-F5344CB8AC3E}">
+        <p14:creationId xmlns:p14="http://schemas.microsoft.com/office/powerpoint/2010/main" val="2961277381"/>
+      </p:ext>
+    </p:extLst>
+  </p:cSld>
+  <p:clrMapOvr>
+    <a:masterClrMapping/>
+  </p:clrMapOvr>
+</p:sld>
+</file>
+
+<file path=ppt/slides/slide3.xml><?xml version="1.0" encoding="utf-8"?>
+<p:sld xmlns:a="http://schemas.openxmlformats.org/drawingml/2006/main" xmlns:r="http://schemas.openxmlformats.org/officeDocument/2006/relationships" xmlns:p="http://schemas.openxmlformats.org/presentationml/2006/main">
+  <p:cSld>
+    <p:spTree>
+      <p:nvGrpSpPr>
+        <p:cNvPr id="1" name=""/>
+        <p:cNvGrpSpPr/>
+        <p:nvPr/>
+      </p:nvGrpSpPr>
+      <p:grpSpPr>
+        <a:xfrm>
+          <a:off x="0" y="0"/>
+          <a:ext cx="0" cy="0"/>
+          <a:chOff x="0" y="0"/>
+          <a:chExt cx="0" cy="0"/>
+        </a:xfrm>
+      </p:grpSpPr>
+      <p:sp>
+        <p:nvSpPr>
           <p:cNvPr id="4" name="TextBox 3">
             <a:extLst>
               <a:ext uri="{FF2B5EF4-FFF2-40B4-BE49-F238E27FC236}">
@@ -10553,8 +11595,8 @@
         </p:nvSpPr>
         <p:spPr>
           <a:xfrm>
-            <a:off x="416560" y="675640"/>
-            <a:ext cx="2377440" cy="640080"/>
+            <a:off x="721360" y="675640"/>
+            <a:ext cx="2194560" cy="646331"/>
           </a:xfrm>
           <a:prstGeom prst="rect">
             <a:avLst/>
@@ -10569,7 +11611,7 @@
           <a:p>
             <a:r>
               <a:rPr lang="en-US" sz="3600" b="1" dirty="0"/>
-              <a:t>Conclusion</a:t>
+              <a:t>Contents </a:t>
             </a:r>
           </a:p>
         </p:txBody>
@@ -10590,7 +11632,7 @@
         </p:nvCxnSpPr>
         <p:spPr>
           <a:xfrm>
-            <a:off x="294640" y="1321971"/>
+            <a:off x="355600" y="1382931"/>
             <a:ext cx="2743200" cy="0"/>
           </a:xfrm>
           <a:prstGeom prst="line">
@@ -10622,10 +11664,10 @@
       </p:cxnSp>
       <p:sp>
         <p:nvSpPr>
-          <p:cNvPr id="6" name="TextBox 5">
-            <a:extLst>
-              <a:ext uri="{FF2B5EF4-FFF2-40B4-BE49-F238E27FC236}">
-                <a16:creationId xmlns:a16="http://schemas.microsoft.com/office/drawing/2014/main" id="{57CC0083-6D2E-CFA0-B34B-C13C38CC22CF}"/>
+          <p:cNvPr id="10" name="TextBox 9">
+            <a:extLst>
+              <a:ext uri="{FF2B5EF4-FFF2-40B4-BE49-F238E27FC236}">
+                <a16:creationId xmlns:a16="http://schemas.microsoft.com/office/drawing/2014/main" id="{603D59D7-9A28-C65D-5390-DFAD2739FC7B}"/>
               </a:ext>
             </a:extLst>
           </p:cNvPr>
@@ -10634,8 +11676,8 @@
         </p:nvSpPr>
         <p:spPr>
           <a:xfrm>
-            <a:off x="528320" y="1752600"/>
-            <a:ext cx="11104880" cy="3416320"/>
+            <a:off x="1036320" y="1781155"/>
+            <a:ext cx="6522720" cy="4401205"/>
           </a:xfrm>
           <a:prstGeom prst="rect">
             <a:avLst/>
@@ -10648,156 +11690,6 @@
           </a:bodyPr>
           <a:lstStyle/>
           <a:p>
-            <a:pPr algn="just"/>
-            <a:r>
-              <a:rPr lang="en-US" sz="2400" dirty="0"/>
-              <a:t>The integration of an ultrasonic sensor, servo motor, and L293D motor driver offers a sophisticated solution for autonomous robotic navigation. It enhances obstacle detection with broader coverage, ensures precise movement control, and reduces navigation errors. A mean-based algorithm improves path selection accuracy by minimizing false positives. Future developments could include AI-driven obstacle recognition, adaptive navigation through machine learning, and additional sensors for greater reliability. This innovative system is cost-effective and ideal for applications in industrial automation, autonomous vehicle navigation, and hazardous environment exploration.</a:t>
-            </a:r>
-            <a:endParaRPr lang="en-US" sz="2400" dirty="0">
-              <a:latin typeface="+mj-lt"/>
-            </a:endParaRPr>
-          </a:p>
-        </p:txBody>
-      </p:sp>
-    </p:spTree>
-    <p:extLst>
-      <p:ext uri="{BB962C8B-B14F-4D97-AF65-F5344CB8AC3E}">
-        <p14:creationId xmlns:p14="http://schemas.microsoft.com/office/powerpoint/2010/main" val="2342501199"/>
-      </p:ext>
-    </p:extLst>
-  </p:cSld>
-  <p:clrMapOvr>
-    <a:masterClrMapping/>
-  </p:clrMapOvr>
-</p:sld>
-</file>
-
-<file path=ppt/slides/slide3.xml><?xml version="1.0" encoding="utf-8"?>
-<p:sld xmlns:a="http://schemas.openxmlformats.org/drawingml/2006/main" xmlns:r="http://schemas.openxmlformats.org/officeDocument/2006/relationships" xmlns:p="http://schemas.openxmlformats.org/presentationml/2006/main">
-  <p:cSld>
-    <p:spTree>
-      <p:nvGrpSpPr>
-        <p:cNvPr id="1" name=""/>
-        <p:cNvGrpSpPr/>
-        <p:nvPr/>
-      </p:nvGrpSpPr>
-      <p:grpSpPr>
-        <a:xfrm>
-          <a:off x="0" y="0"/>
-          <a:ext cx="0" cy="0"/>
-          <a:chOff x="0" y="0"/>
-          <a:chExt cx="0" cy="0"/>
-        </a:xfrm>
-      </p:grpSpPr>
-      <p:sp>
-        <p:nvSpPr>
-          <p:cNvPr id="4" name="TextBox 3">
-            <a:extLst>
-              <a:ext uri="{FF2B5EF4-FFF2-40B4-BE49-F238E27FC236}">
-                <a16:creationId xmlns:a16="http://schemas.microsoft.com/office/drawing/2014/main" id="{17C97D89-3979-D9EC-2F9E-F1BA5D0A9EF4}"/>
-              </a:ext>
-            </a:extLst>
-          </p:cNvPr>
-          <p:cNvSpPr txBox="1"/>
-          <p:nvPr/>
-        </p:nvSpPr>
-        <p:spPr>
-          <a:xfrm>
-            <a:off x="721360" y="675640"/>
-            <a:ext cx="2194560" cy="646331"/>
-          </a:xfrm>
-          <a:prstGeom prst="rect">
-            <a:avLst/>
-          </a:prstGeom>
-          <a:noFill/>
-        </p:spPr>
-        <p:txBody>
-          <a:bodyPr wrap="square" rtlCol="0">
-            <a:spAutoFit/>
-          </a:bodyPr>
-          <a:lstStyle/>
-          <a:p>
-            <a:r>
-              <a:rPr lang="en-US" sz="3600" b="1" dirty="0"/>
-              <a:t>Contents </a:t>
-            </a:r>
-          </a:p>
-        </p:txBody>
-      </p:sp>
-      <p:cxnSp>
-        <p:nvCxnSpPr>
-          <p:cNvPr id="9" name="Straight Connector 8">
-            <a:extLst>
-              <a:ext uri="{FF2B5EF4-FFF2-40B4-BE49-F238E27FC236}">
-                <a16:creationId xmlns:a16="http://schemas.microsoft.com/office/drawing/2014/main" id="{06DEB5C5-95DE-9DEC-6F84-929E462EC78F}"/>
-              </a:ext>
-            </a:extLst>
-          </p:cNvPr>
-          <p:cNvCxnSpPr>
-            <a:cxnSpLocks/>
-          </p:cNvCxnSpPr>
-          <p:nvPr/>
-        </p:nvCxnSpPr>
-        <p:spPr>
-          <a:xfrm>
-            <a:off x="355600" y="1382931"/>
-            <a:ext cx="2743200" cy="0"/>
-          </a:xfrm>
-          <a:prstGeom prst="line">
-            <a:avLst/>
-          </a:prstGeom>
-          <a:ln w="28575"/>
-          <a:effectLst>
-            <a:outerShdw blurRad="50800" dist="38100" dir="2700000" algn="tl" rotWithShape="0">
-              <a:prstClr val="black">
-                <a:alpha val="40000"/>
-              </a:prstClr>
-            </a:outerShdw>
-          </a:effectLst>
-        </p:spPr>
-        <p:style>
-          <a:lnRef idx="1">
-            <a:schemeClr val="accent1"/>
-          </a:lnRef>
-          <a:fillRef idx="0">
-            <a:schemeClr val="accent1"/>
-          </a:fillRef>
-          <a:effectRef idx="0">
-            <a:schemeClr val="accent1"/>
-          </a:effectRef>
-          <a:fontRef idx="minor">
-            <a:schemeClr val="tx1"/>
-          </a:fontRef>
-        </p:style>
-      </p:cxnSp>
-      <p:sp>
-        <p:nvSpPr>
-          <p:cNvPr id="10" name="TextBox 9">
-            <a:extLst>
-              <a:ext uri="{FF2B5EF4-FFF2-40B4-BE49-F238E27FC236}">
-                <a16:creationId xmlns:a16="http://schemas.microsoft.com/office/drawing/2014/main" id="{603D59D7-9A28-C65D-5390-DFAD2739FC7B}"/>
-              </a:ext>
-            </a:extLst>
-          </p:cNvPr>
-          <p:cNvSpPr txBox="1"/>
-          <p:nvPr/>
-        </p:nvSpPr>
-        <p:spPr>
-          <a:xfrm>
-            <a:off x="1036320" y="1781155"/>
-            <a:ext cx="6522720" cy="3970318"/>
-          </a:xfrm>
-          <a:prstGeom prst="rect">
-            <a:avLst/>
-          </a:prstGeom>
-          <a:noFill/>
-        </p:spPr>
-        <p:txBody>
-          <a:bodyPr wrap="square" rtlCol="0">
-            <a:spAutoFit/>
-          </a:bodyPr>
-          <a:lstStyle/>
-          <a:p>
             <a:pPr marL="342900" indent="-342900">
               <a:buFont typeface="Arial" panose="020B0604020202020204" pitchFamily="34" charset="0"/>
               <a:buChar char="•"/>
@@ -10912,6 +11804,19 @@
                 <a:cs typeface="Times New Roman" panose="02020603050405020304" pitchFamily="18" charset="0"/>
               </a:rPr>
               <a:t>Advantages and future scope </a:t>
+            </a:r>
+          </a:p>
+          <a:p>
+            <a:pPr marL="342900" indent="-342900">
+              <a:buFont typeface="Arial" panose="020B0604020202020204" pitchFamily="34" charset="0"/>
+              <a:buChar char="•"/>
+            </a:pPr>
+            <a:r>
+              <a:rPr lang="en-US" sz="2800" dirty="0">
+                <a:latin typeface="+mj-lt"/>
+                <a:cs typeface="Times New Roman" panose="02020603050405020304" pitchFamily="18" charset="0"/>
+              </a:rPr>
+              <a:t>Conclusion</a:t>
             </a:r>
           </a:p>
         </p:txBody>
@@ -12205,8 +13110,8 @@
         </p:nvSpPr>
         <p:spPr>
           <a:xfrm>
-            <a:off x="878840" y="2014835"/>
-            <a:ext cx="10434320" cy="3539430"/>
+            <a:off x="878840" y="1811635"/>
+            <a:ext cx="10434320" cy="4524315"/>
           </a:xfrm>
           <a:prstGeom prst="rect">
             <a:avLst/>
@@ -12300,6 +13205,30 @@
                 <a:latin typeface="+mj-lt"/>
               </a:rPr>
               <a:t>Jumper wires</a:t>
+            </a:r>
+          </a:p>
+          <a:p>
+            <a:pPr marL="342900" indent="-342900">
+              <a:buFont typeface="Arial" panose="020B0604020202020204" pitchFamily="34" charset="0"/>
+              <a:buChar char="•"/>
+            </a:pPr>
+            <a:r>
+              <a:rPr lang="en-US" sz="3200" dirty="0">
+                <a:latin typeface="+mj-lt"/>
+              </a:rPr>
+              <a:t>Lcd display</a:t>
+            </a:r>
+          </a:p>
+          <a:p>
+            <a:pPr marL="342900" indent="-342900">
+              <a:buFont typeface="Arial" panose="020B0604020202020204" pitchFamily="34" charset="0"/>
+              <a:buChar char="•"/>
+            </a:pPr>
+            <a:r>
+              <a:rPr lang="en-US" sz="3200" dirty="0">
+                <a:latin typeface="+mj-lt"/>
+              </a:rPr>
+              <a:t>Transformer</a:t>
             </a:r>
           </a:p>
         </p:txBody>

</xml_diff>